<commit_message>
fail to solve 1671
</commit_message>
<xml_diff>
--- a/PPT 발표자료/이동석 2019년 8월 24일 알고스 문제풀이.pptx
+++ b/PPT 발표자료/이동석 2019년 8월 24일 알고스 문제풀이.pptx
@@ -5,22 +5,23 @@
     <p:sldMasterId id="2147483660" r:id="rId4"/>
   </p:sldMasterIdLst>
   <p:notesMasterIdLst>
-    <p:notesMasterId r:id="rId15"/>
+    <p:notesMasterId r:id="rId16"/>
   </p:notesMasterIdLst>
   <p:handoutMasterIdLst>
-    <p:handoutMasterId r:id="rId16"/>
+    <p:handoutMasterId r:id="rId17"/>
   </p:handoutMasterIdLst>
   <p:sldIdLst>
     <p:sldId id="256" r:id="rId5"/>
     <p:sldId id="271" r:id="rId6"/>
     <p:sldId id="283" r:id="rId7"/>
-    <p:sldId id="279" r:id="rId8"/>
-    <p:sldId id="281" r:id="rId9"/>
-    <p:sldId id="280" r:id="rId10"/>
-    <p:sldId id="257" r:id="rId11"/>
-    <p:sldId id="275" r:id="rId12"/>
-    <p:sldId id="276" r:id="rId13"/>
-    <p:sldId id="282" r:id="rId14"/>
+    <p:sldId id="284" r:id="rId8"/>
+    <p:sldId id="279" r:id="rId9"/>
+    <p:sldId id="281" r:id="rId10"/>
+    <p:sldId id="280" r:id="rId11"/>
+    <p:sldId id="257" r:id="rId12"/>
+    <p:sldId id="275" r:id="rId13"/>
+    <p:sldId id="276" r:id="rId14"/>
+    <p:sldId id="282" r:id="rId15"/>
   </p:sldIdLst>
   <p:sldSz cx="12192000" cy="6858000"/>
   <p:notesSz cx="6858000" cy="9144000"/>
@@ -131,6 +132,7 @@
           <p14:sldIdLst>
             <p14:sldId id="271"/>
             <p14:sldId id="283"/>
+            <p14:sldId id="284"/>
             <p14:sldId id="279"/>
             <p14:sldId id="281"/>
             <p14:sldId id="280"/>
@@ -854,7 +856,7 @@
           <a:p>
             <a:fld id="{DF61EA0F-A667-4B49-8422-0062BC55E249}" type="slidenum">
               <a:rPr lang="en-US" smtClean="0"/>
-              <a:t>10</a:t>
+              <a:t>11</a:t>
             </a:fld>
             <a:endParaRPr lang="en-US" dirty="0"/>
           </a:p>
@@ -2526,6 +2528,1482 @@
       </p:grpSpPr>
       <p:sp>
         <p:nvSpPr>
+          <p:cNvPr id="8" name="Title 7"/>
+          <p:cNvSpPr>
+            <a:spLocks noGrp="1"/>
+          </p:cNvSpPr>
+          <p:nvPr>
+            <p:ph type="title"/>
+          </p:nvPr>
+        </p:nvSpPr>
+        <p:spPr/>
+        <p:txBody>
+          <a:bodyPr/>
+          <a:lstStyle/>
+          <a:p>
+            <a:r>
+              <a:rPr lang="en-US" dirty="0">
+                <a:latin typeface="Segoe UI Light" panose="020B0502040204020203" pitchFamily="34" charset="0"/>
+                <a:cs typeface="Segoe UI Light" panose="020B0502040204020203" pitchFamily="34" charset="0"/>
+              </a:rPr>
+              <a:t>Explore without leaving your slides</a:t>
+            </a:r>
+          </a:p>
+        </p:txBody>
+      </p:sp>
+      <p:sp>
+        <p:nvSpPr>
+          <p:cNvPr id="16" name="Content Placeholder 17"/>
+          <p:cNvSpPr txBox="1">
+            <a:spLocks/>
+          </p:cNvSpPr>
+          <p:nvPr/>
+        </p:nvSpPr>
+        <p:spPr>
+          <a:xfrm>
+            <a:off x="541609" y="1296100"/>
+            <a:ext cx="6093106" cy="1236475"/>
+          </a:xfrm>
+          <a:prstGeom prst="rect">
+            <a:avLst/>
+          </a:prstGeom>
+        </p:spPr>
+        <p:txBody>
+          <a:bodyPr vert="horz" lIns="91440" tIns="45720" rIns="91440" bIns="45720" rtlCol="0">
+            <a:normAutofit/>
+          </a:bodyPr>
+          <a:lstStyle>
+            <a:lvl1pPr marL="228600" indent="-228600" algn="l" defTabSz="914400" rtl="0" eaLnBrk="1" latinLnBrk="0" hangingPunct="1">
+              <a:lnSpc>
+                <a:spcPts val="1800"/>
+              </a:lnSpc>
+              <a:spcBef>
+                <a:spcPts val="1000"/>
+              </a:spcBef>
+              <a:spcAft>
+                <a:spcPts val="1000"/>
+              </a:spcAft>
+              <a:buFont typeface="Arial" panose="020B0604020202020204" pitchFamily="34" charset="0"/>
+              <a:buChar char="•"/>
+              <a:defRPr lang="en-US" sz="1200" kern="1200" smtClean="0">
+                <a:solidFill>
+                  <a:schemeClr val="tx1">
+                    <a:lumMod val="75000"/>
+                    <a:lumOff val="25000"/>
+                  </a:schemeClr>
+                </a:solidFill>
+                <a:latin typeface="+mn-lt"/>
+                <a:ea typeface="+mn-ea"/>
+                <a:cs typeface="+mn-cs"/>
+              </a:defRPr>
+            </a:lvl1pPr>
+            <a:lvl2pPr marL="685800" indent="-228600" algn="l" defTabSz="914400" rtl="0" eaLnBrk="1" latinLnBrk="0" hangingPunct="1">
+              <a:lnSpc>
+                <a:spcPts val="1800"/>
+              </a:lnSpc>
+              <a:spcBef>
+                <a:spcPts val="1000"/>
+              </a:spcBef>
+              <a:spcAft>
+                <a:spcPts val="1000"/>
+              </a:spcAft>
+              <a:buFont typeface="Arial" panose="020B0604020202020204" pitchFamily="34" charset="0"/>
+              <a:buChar char="•"/>
+              <a:defRPr lang="en-US" sz="1200" kern="1200" smtClean="0">
+                <a:solidFill>
+                  <a:schemeClr val="tx1">
+                    <a:lumMod val="75000"/>
+                    <a:lumOff val="25000"/>
+                  </a:schemeClr>
+                </a:solidFill>
+                <a:latin typeface="+mn-lt"/>
+                <a:ea typeface="+mn-ea"/>
+                <a:cs typeface="+mn-cs"/>
+              </a:defRPr>
+            </a:lvl2pPr>
+            <a:lvl3pPr marL="1143000" indent="-228600" algn="l" defTabSz="914400" rtl="0" eaLnBrk="1" latinLnBrk="0" hangingPunct="1">
+              <a:lnSpc>
+                <a:spcPts val="1800"/>
+              </a:lnSpc>
+              <a:spcBef>
+                <a:spcPts val="1000"/>
+              </a:spcBef>
+              <a:spcAft>
+                <a:spcPts val="1000"/>
+              </a:spcAft>
+              <a:buFont typeface="Arial" panose="020B0604020202020204" pitchFamily="34" charset="0"/>
+              <a:buChar char="•"/>
+              <a:defRPr lang="en-US" sz="1200" kern="1200" smtClean="0">
+                <a:solidFill>
+                  <a:schemeClr val="tx1">
+                    <a:lumMod val="75000"/>
+                    <a:lumOff val="25000"/>
+                  </a:schemeClr>
+                </a:solidFill>
+                <a:latin typeface="+mn-lt"/>
+                <a:ea typeface="+mn-ea"/>
+                <a:cs typeface="+mn-cs"/>
+              </a:defRPr>
+            </a:lvl3pPr>
+            <a:lvl4pPr marL="1600200" indent="-228600" algn="l" defTabSz="914400" rtl="0" eaLnBrk="1" latinLnBrk="0" hangingPunct="1">
+              <a:lnSpc>
+                <a:spcPts val="1800"/>
+              </a:lnSpc>
+              <a:spcBef>
+                <a:spcPts val="1000"/>
+              </a:spcBef>
+              <a:spcAft>
+                <a:spcPts val="1000"/>
+              </a:spcAft>
+              <a:buFont typeface="Arial" panose="020B0604020202020204" pitchFamily="34" charset="0"/>
+              <a:buChar char="•"/>
+              <a:defRPr lang="en-US" sz="1200" kern="1200" smtClean="0">
+                <a:solidFill>
+                  <a:schemeClr val="tx1">
+                    <a:lumMod val="75000"/>
+                    <a:lumOff val="25000"/>
+                  </a:schemeClr>
+                </a:solidFill>
+                <a:latin typeface="+mn-lt"/>
+                <a:ea typeface="+mn-ea"/>
+                <a:cs typeface="+mn-cs"/>
+              </a:defRPr>
+            </a:lvl4pPr>
+            <a:lvl5pPr marL="2057400" indent="-228600" algn="l" defTabSz="914400" rtl="0" eaLnBrk="1" latinLnBrk="0" hangingPunct="1">
+              <a:lnSpc>
+                <a:spcPts val="1800"/>
+              </a:lnSpc>
+              <a:spcBef>
+                <a:spcPts val="1000"/>
+              </a:spcBef>
+              <a:spcAft>
+                <a:spcPts val="1000"/>
+              </a:spcAft>
+              <a:buFont typeface="Arial" panose="020B0604020202020204" pitchFamily="34" charset="0"/>
+              <a:buChar char="•"/>
+              <a:defRPr lang="en-US" sz="1200" kern="1200">
+                <a:solidFill>
+                  <a:schemeClr val="tx1">
+                    <a:lumMod val="75000"/>
+                    <a:lumOff val="25000"/>
+                  </a:schemeClr>
+                </a:solidFill>
+                <a:latin typeface="+mn-lt"/>
+                <a:ea typeface="+mn-ea"/>
+                <a:cs typeface="+mn-cs"/>
+              </a:defRPr>
+            </a:lvl5pPr>
+            <a:lvl6pPr marL="2514600" indent="-228600" algn="l" defTabSz="914400" rtl="0" eaLnBrk="1" latinLnBrk="0" hangingPunct="1">
+              <a:lnSpc>
+                <a:spcPct val="90000"/>
+              </a:lnSpc>
+              <a:spcBef>
+                <a:spcPct val="30000"/>
+              </a:spcBef>
+              <a:buFont typeface="Arial" panose="020B0604020202020204" pitchFamily="34" charset="0"/>
+              <a:buChar char="•"/>
+              <a:defRPr sz="1800" kern="1200">
+                <a:solidFill>
+                  <a:schemeClr val="tx1"/>
+                </a:solidFill>
+                <a:latin typeface="+mn-lt"/>
+                <a:ea typeface="+mn-ea"/>
+                <a:cs typeface="+mn-cs"/>
+              </a:defRPr>
+            </a:lvl6pPr>
+            <a:lvl7pPr marL="2971800" indent="-228600" algn="l" defTabSz="914400" rtl="0" eaLnBrk="1" latinLnBrk="0" hangingPunct="1">
+              <a:lnSpc>
+                <a:spcPct val="90000"/>
+              </a:lnSpc>
+              <a:spcBef>
+                <a:spcPct val="30000"/>
+              </a:spcBef>
+              <a:buFont typeface="Arial" panose="020B0604020202020204" pitchFamily="34" charset="0"/>
+              <a:buChar char="•"/>
+              <a:defRPr sz="1800" kern="1200">
+                <a:solidFill>
+                  <a:schemeClr val="tx1"/>
+                </a:solidFill>
+                <a:latin typeface="+mn-lt"/>
+                <a:ea typeface="+mn-ea"/>
+                <a:cs typeface="+mn-cs"/>
+              </a:defRPr>
+            </a:lvl7pPr>
+            <a:lvl8pPr marL="3429000" indent="-228600" algn="l" defTabSz="914400" rtl="0" eaLnBrk="1" latinLnBrk="0" hangingPunct="1">
+              <a:lnSpc>
+                <a:spcPct val="90000"/>
+              </a:lnSpc>
+              <a:spcBef>
+                <a:spcPct val="30000"/>
+              </a:spcBef>
+              <a:buFont typeface="Arial" panose="020B0604020202020204" pitchFamily="34" charset="0"/>
+              <a:buChar char="•"/>
+              <a:defRPr sz="1800" kern="1200">
+                <a:solidFill>
+                  <a:schemeClr val="tx1"/>
+                </a:solidFill>
+                <a:latin typeface="+mn-lt"/>
+                <a:ea typeface="+mn-ea"/>
+                <a:cs typeface="+mn-cs"/>
+              </a:defRPr>
+            </a:lvl8pPr>
+            <a:lvl9pPr marL="3886200" indent="-228600" algn="l" defTabSz="914400" rtl="0" eaLnBrk="1" latinLnBrk="0" hangingPunct="1">
+              <a:lnSpc>
+                <a:spcPct val="90000"/>
+              </a:lnSpc>
+              <a:spcBef>
+                <a:spcPct val="30000"/>
+              </a:spcBef>
+              <a:buFont typeface="Arial" panose="020B0604020202020204" pitchFamily="34" charset="0"/>
+              <a:buChar char="•"/>
+              <a:defRPr sz="1800" kern="1200">
+                <a:solidFill>
+                  <a:schemeClr val="tx1"/>
+                </a:solidFill>
+                <a:latin typeface="+mn-lt"/>
+                <a:ea typeface="+mn-ea"/>
+                <a:cs typeface="+mn-cs"/>
+              </a:defRPr>
+            </a:lvl9pPr>
+          </a:lstStyle>
+          <a:p>
+            <a:pPr marL="0" indent="0">
+              <a:spcAft>
+                <a:spcPts val="2000"/>
+              </a:spcAft>
+              <a:buNone/>
+            </a:pPr>
+            <a:r>
+              <a:rPr lang="en-US" dirty="0">
+                <a:latin typeface="Segoe UI" panose="020B0502040204020203" pitchFamily="34" charset="0"/>
+                <a:cs typeface="Segoe UI" panose="020B0502040204020203" pitchFamily="34" charset="0"/>
+              </a:rPr>
+              <a:t>Smart Lookup brings research directly in to PowerPoint.</a:t>
+            </a:r>
+            <a:br>
+              <a:rPr lang="en-US" dirty="0">
+                <a:latin typeface="Segoe UI" panose="020B0502040204020203" pitchFamily="34" charset="0"/>
+                <a:cs typeface="Segoe UI" panose="020B0502040204020203" pitchFamily="34" charset="0"/>
+              </a:rPr>
+            </a:br>
+            <a:br>
+              <a:rPr lang="en-US" dirty="0">
+                <a:latin typeface="Segoe UI" panose="020B0502040204020203" pitchFamily="34" charset="0"/>
+                <a:cs typeface="Segoe UI" panose="020B0502040204020203" pitchFamily="34" charset="0"/>
+              </a:rPr>
+            </a:br>
+            <a:r>
+              <a:rPr lang="en-US" dirty="0">
+                <a:latin typeface="Segoe UI" panose="020B0502040204020203" pitchFamily="34" charset="0"/>
+                <a:cs typeface="Segoe UI" panose="020B0502040204020203" pitchFamily="34" charset="0"/>
+              </a:rPr>
+              <a:t>Try it:</a:t>
+            </a:r>
+          </a:p>
+        </p:txBody>
+      </p:sp>
+      <p:pic>
+        <p:nvPicPr>
+          <p:cNvPr id="18" name="Picture 17" descr="Three pictures showing the Smart Lookup feature"/>
+          <p:cNvPicPr>
+            <a:picLocks noChangeAspect="1"/>
+          </p:cNvPicPr>
+          <p:nvPr/>
+        </p:nvPicPr>
+        <p:blipFill>
+          <a:blip r:embed="rId2" cstate="print">
+            <a:extLst>
+              <a:ext uri="{28A0092B-C50C-407E-A947-70E740481C1C}">
+                <a14:useLocalDpi xmlns:a14="http://schemas.microsoft.com/office/drawing/2010/main" val="0"/>
+              </a:ext>
+            </a:extLst>
+          </a:blip>
+          <a:stretch>
+            <a:fillRect/>
+          </a:stretch>
+        </p:blipFill>
+        <p:spPr>
+          <a:xfrm>
+            <a:off x="494408" y="2144574"/>
+            <a:ext cx="11129521" cy="3198055"/>
+          </a:xfrm>
+          <a:prstGeom prst="rect">
+            <a:avLst/>
+          </a:prstGeom>
+        </p:spPr>
+      </p:pic>
+      <p:grpSp>
+        <p:nvGrpSpPr>
+          <p:cNvPr id="33" name="Group 32" descr="Small circle with number 1 inside  indicating step 1"/>
+          <p:cNvGrpSpPr/>
+          <p:nvPr/>
+        </p:nvGrpSpPr>
+        <p:grpSpPr bwMode="blackWhite">
+          <a:xfrm>
+            <a:off x="558723" y="5233381"/>
+            <a:ext cx="558179" cy="409838"/>
+            <a:chOff x="6953426" y="711274"/>
+            <a:chExt cx="558179" cy="409838"/>
+          </a:xfrm>
+        </p:grpSpPr>
+        <p:sp>
+          <p:nvSpPr>
+            <p:cNvPr id="34" name="Oval 33" descr="Small circle"/>
+            <p:cNvSpPr/>
+            <p:nvPr/>
+          </p:nvSpPr>
+          <p:spPr bwMode="blackWhite">
+            <a:xfrm>
+              <a:off x="7025069" y="711274"/>
+              <a:ext cx="409838" cy="409838"/>
+            </a:xfrm>
+            <a:prstGeom prst="ellipse">
+              <a:avLst/>
+            </a:prstGeom>
+            <a:solidFill>
+              <a:srgbClr val="D24726"/>
+            </a:solidFill>
+            <a:ln>
+              <a:noFill/>
+            </a:ln>
+          </p:spPr>
+          <p:style>
+            <a:lnRef idx="2">
+              <a:schemeClr val="accent1">
+                <a:shade val="50000"/>
+              </a:schemeClr>
+            </a:lnRef>
+            <a:fillRef idx="1">
+              <a:schemeClr val="accent1"/>
+            </a:fillRef>
+            <a:effectRef idx="0">
+              <a:schemeClr val="accent1"/>
+            </a:effectRef>
+            <a:fontRef idx="minor">
+              <a:schemeClr val="lt1"/>
+            </a:fontRef>
+          </p:style>
+          <p:txBody>
+            <a:bodyPr rtlCol="0" anchor="ctr"/>
+            <a:lstStyle/>
+            <a:p>
+              <a:pPr algn="ctr"/>
+              <a:endParaRPr lang="en-US" dirty="0"/>
+            </a:p>
+          </p:txBody>
+        </p:sp>
+        <p:sp>
+          <p:nvSpPr>
+            <p:cNvPr id="35" name="TextBox 34" descr="Number 1"/>
+            <p:cNvSpPr txBox="1"/>
+            <p:nvPr/>
+          </p:nvSpPr>
+          <p:spPr bwMode="blackWhite">
+            <a:xfrm>
+              <a:off x="6953426" y="727564"/>
+              <a:ext cx="558179" cy="369332"/>
+            </a:xfrm>
+            <a:prstGeom prst="rect">
+              <a:avLst/>
+            </a:prstGeom>
+            <a:noFill/>
+          </p:spPr>
+          <p:txBody>
+            <a:bodyPr wrap="square" rtlCol="0">
+              <a:spAutoFit/>
+            </a:bodyPr>
+            <a:lstStyle/>
+            <a:p>
+              <a:pPr algn="ctr"/>
+              <a:r>
+                <a:rPr lang="en-US" dirty="0">
+                  <a:solidFill>
+                    <a:schemeClr val="bg1"/>
+                  </a:solidFill>
+                  <a:latin typeface="Segoe UI Semibold" panose="020B0702040204020203" pitchFamily="34" charset="0"/>
+                  <a:cs typeface="Segoe UI Semibold" panose="020B0702040204020203" pitchFamily="34" charset="0"/>
+                </a:rPr>
+                <a:t>1</a:t>
+              </a:r>
+            </a:p>
+          </p:txBody>
+        </p:sp>
+      </p:grpSp>
+      <p:sp>
+        <p:nvSpPr>
+          <p:cNvPr id="42" name="Content Placeholder 17"/>
+          <p:cNvSpPr txBox="1">
+            <a:spLocks/>
+          </p:cNvSpPr>
+          <p:nvPr/>
+        </p:nvSpPr>
+        <p:spPr>
+          <a:xfrm>
+            <a:off x="1066038" y="5273573"/>
+            <a:ext cx="2919669" cy="1298398"/>
+          </a:xfrm>
+          <a:prstGeom prst="rect">
+            <a:avLst/>
+          </a:prstGeom>
+        </p:spPr>
+        <p:txBody>
+          <a:bodyPr vert="horz" lIns="91440" tIns="45720" rIns="91440" bIns="45720" rtlCol="0">
+            <a:normAutofit/>
+          </a:bodyPr>
+          <a:lstStyle>
+            <a:lvl1pPr marL="228600" indent="-228600" algn="l" defTabSz="914400" rtl="0" eaLnBrk="1" latinLnBrk="0" hangingPunct="1">
+              <a:lnSpc>
+                <a:spcPts val="1800"/>
+              </a:lnSpc>
+              <a:spcBef>
+                <a:spcPts val="1000"/>
+              </a:spcBef>
+              <a:spcAft>
+                <a:spcPts val="1000"/>
+              </a:spcAft>
+              <a:buFont typeface="Arial" panose="020B0604020202020204" pitchFamily="34" charset="0"/>
+              <a:buChar char="•"/>
+              <a:defRPr lang="en-US" sz="1200" kern="1200" smtClean="0">
+                <a:solidFill>
+                  <a:schemeClr val="tx1">
+                    <a:lumMod val="75000"/>
+                    <a:lumOff val="25000"/>
+                  </a:schemeClr>
+                </a:solidFill>
+                <a:latin typeface="+mn-lt"/>
+                <a:ea typeface="+mn-ea"/>
+                <a:cs typeface="+mn-cs"/>
+              </a:defRPr>
+            </a:lvl1pPr>
+            <a:lvl2pPr marL="685800" indent="-228600" algn="l" defTabSz="914400" rtl="0" eaLnBrk="1" latinLnBrk="0" hangingPunct="1">
+              <a:lnSpc>
+                <a:spcPts val="1800"/>
+              </a:lnSpc>
+              <a:spcBef>
+                <a:spcPts val="1000"/>
+              </a:spcBef>
+              <a:spcAft>
+                <a:spcPts val="1000"/>
+              </a:spcAft>
+              <a:buFont typeface="Arial" panose="020B0604020202020204" pitchFamily="34" charset="0"/>
+              <a:buChar char="•"/>
+              <a:defRPr lang="en-US" sz="1200" kern="1200" smtClean="0">
+                <a:solidFill>
+                  <a:schemeClr val="tx1">
+                    <a:lumMod val="75000"/>
+                    <a:lumOff val="25000"/>
+                  </a:schemeClr>
+                </a:solidFill>
+                <a:latin typeface="+mn-lt"/>
+                <a:ea typeface="+mn-ea"/>
+                <a:cs typeface="+mn-cs"/>
+              </a:defRPr>
+            </a:lvl2pPr>
+            <a:lvl3pPr marL="1143000" indent="-228600" algn="l" defTabSz="914400" rtl="0" eaLnBrk="1" latinLnBrk="0" hangingPunct="1">
+              <a:lnSpc>
+                <a:spcPts val="1800"/>
+              </a:lnSpc>
+              <a:spcBef>
+                <a:spcPts val="1000"/>
+              </a:spcBef>
+              <a:spcAft>
+                <a:spcPts val="1000"/>
+              </a:spcAft>
+              <a:buFont typeface="Arial" panose="020B0604020202020204" pitchFamily="34" charset="0"/>
+              <a:buChar char="•"/>
+              <a:defRPr lang="en-US" sz="1200" kern="1200" smtClean="0">
+                <a:solidFill>
+                  <a:schemeClr val="tx1">
+                    <a:lumMod val="75000"/>
+                    <a:lumOff val="25000"/>
+                  </a:schemeClr>
+                </a:solidFill>
+                <a:latin typeface="+mn-lt"/>
+                <a:ea typeface="+mn-ea"/>
+                <a:cs typeface="+mn-cs"/>
+              </a:defRPr>
+            </a:lvl3pPr>
+            <a:lvl4pPr marL="1600200" indent="-228600" algn="l" defTabSz="914400" rtl="0" eaLnBrk="1" latinLnBrk="0" hangingPunct="1">
+              <a:lnSpc>
+                <a:spcPts val="1800"/>
+              </a:lnSpc>
+              <a:spcBef>
+                <a:spcPts val="1000"/>
+              </a:spcBef>
+              <a:spcAft>
+                <a:spcPts val="1000"/>
+              </a:spcAft>
+              <a:buFont typeface="Arial" panose="020B0604020202020204" pitchFamily="34" charset="0"/>
+              <a:buChar char="•"/>
+              <a:defRPr lang="en-US" sz="1200" kern="1200" smtClean="0">
+                <a:solidFill>
+                  <a:schemeClr val="tx1">
+                    <a:lumMod val="75000"/>
+                    <a:lumOff val="25000"/>
+                  </a:schemeClr>
+                </a:solidFill>
+                <a:latin typeface="+mn-lt"/>
+                <a:ea typeface="+mn-ea"/>
+                <a:cs typeface="+mn-cs"/>
+              </a:defRPr>
+            </a:lvl4pPr>
+            <a:lvl5pPr marL="2057400" indent="-228600" algn="l" defTabSz="914400" rtl="0" eaLnBrk="1" latinLnBrk="0" hangingPunct="1">
+              <a:lnSpc>
+                <a:spcPts val="1800"/>
+              </a:lnSpc>
+              <a:spcBef>
+                <a:spcPts val="1000"/>
+              </a:spcBef>
+              <a:spcAft>
+                <a:spcPts val="1000"/>
+              </a:spcAft>
+              <a:buFont typeface="Arial" panose="020B0604020202020204" pitchFamily="34" charset="0"/>
+              <a:buChar char="•"/>
+              <a:defRPr lang="en-US" sz="1200" kern="1200">
+                <a:solidFill>
+                  <a:schemeClr val="tx1">
+                    <a:lumMod val="75000"/>
+                    <a:lumOff val="25000"/>
+                  </a:schemeClr>
+                </a:solidFill>
+                <a:latin typeface="+mn-lt"/>
+                <a:ea typeface="+mn-ea"/>
+                <a:cs typeface="+mn-cs"/>
+              </a:defRPr>
+            </a:lvl5pPr>
+            <a:lvl6pPr marL="2514600" indent="-228600" algn="l" defTabSz="914400" rtl="0" eaLnBrk="1" latinLnBrk="0" hangingPunct="1">
+              <a:lnSpc>
+                <a:spcPct val="90000"/>
+              </a:lnSpc>
+              <a:spcBef>
+                <a:spcPct val="30000"/>
+              </a:spcBef>
+              <a:buFont typeface="Arial" panose="020B0604020202020204" pitchFamily="34" charset="0"/>
+              <a:buChar char="•"/>
+              <a:defRPr sz="1800" kern="1200">
+                <a:solidFill>
+                  <a:schemeClr val="tx1"/>
+                </a:solidFill>
+                <a:latin typeface="+mn-lt"/>
+                <a:ea typeface="+mn-ea"/>
+                <a:cs typeface="+mn-cs"/>
+              </a:defRPr>
+            </a:lvl6pPr>
+            <a:lvl7pPr marL="2971800" indent="-228600" algn="l" defTabSz="914400" rtl="0" eaLnBrk="1" latinLnBrk="0" hangingPunct="1">
+              <a:lnSpc>
+                <a:spcPct val="90000"/>
+              </a:lnSpc>
+              <a:spcBef>
+                <a:spcPct val="30000"/>
+              </a:spcBef>
+              <a:buFont typeface="Arial" panose="020B0604020202020204" pitchFamily="34" charset="0"/>
+              <a:buChar char="•"/>
+              <a:defRPr sz="1800" kern="1200">
+                <a:solidFill>
+                  <a:schemeClr val="tx1"/>
+                </a:solidFill>
+                <a:latin typeface="+mn-lt"/>
+                <a:ea typeface="+mn-ea"/>
+                <a:cs typeface="+mn-cs"/>
+              </a:defRPr>
+            </a:lvl7pPr>
+            <a:lvl8pPr marL="3429000" indent="-228600" algn="l" defTabSz="914400" rtl="0" eaLnBrk="1" latinLnBrk="0" hangingPunct="1">
+              <a:lnSpc>
+                <a:spcPct val="90000"/>
+              </a:lnSpc>
+              <a:spcBef>
+                <a:spcPct val="30000"/>
+              </a:spcBef>
+              <a:buFont typeface="Arial" panose="020B0604020202020204" pitchFamily="34" charset="0"/>
+              <a:buChar char="•"/>
+              <a:defRPr sz="1800" kern="1200">
+                <a:solidFill>
+                  <a:schemeClr val="tx1"/>
+                </a:solidFill>
+                <a:latin typeface="+mn-lt"/>
+                <a:ea typeface="+mn-ea"/>
+                <a:cs typeface="+mn-cs"/>
+              </a:defRPr>
+            </a:lvl8pPr>
+            <a:lvl9pPr marL="3886200" indent="-228600" algn="l" defTabSz="914400" rtl="0" eaLnBrk="1" latinLnBrk="0" hangingPunct="1">
+              <a:lnSpc>
+                <a:spcPct val="90000"/>
+              </a:lnSpc>
+              <a:spcBef>
+                <a:spcPct val="30000"/>
+              </a:spcBef>
+              <a:buFont typeface="Arial" panose="020B0604020202020204" pitchFamily="34" charset="0"/>
+              <a:buChar char="•"/>
+              <a:defRPr sz="1800" kern="1200">
+                <a:solidFill>
+                  <a:schemeClr val="tx1"/>
+                </a:solidFill>
+                <a:latin typeface="+mn-lt"/>
+                <a:ea typeface="+mn-ea"/>
+                <a:cs typeface="+mn-cs"/>
+              </a:defRPr>
+            </a:lvl9pPr>
+          </a:lstStyle>
+          <a:p>
+            <a:pPr marL="0" indent="0">
+              <a:spcAft>
+                <a:spcPts val="2000"/>
+              </a:spcAft>
+              <a:buNone/>
+            </a:pPr>
+            <a:r>
+              <a:rPr lang="en-US" dirty="0">
+                <a:solidFill>
+                  <a:prstClr val="black">
+                    <a:lumMod val="75000"/>
+                    <a:lumOff val="25000"/>
+                  </a:prstClr>
+                </a:solidFill>
+                <a:latin typeface="Segoe UI" panose="020B0502040204020203" pitchFamily="34" charset="0"/>
+                <a:cs typeface="Segoe UI" panose="020B0502040204020203" pitchFamily="34" charset="0"/>
+              </a:rPr>
+              <a:t>Right-click in the word </a:t>
+            </a:r>
+            <a:r>
+              <a:rPr lang="en-US" i="1" dirty="0">
+                <a:solidFill>
+                  <a:srgbClr val="D24726"/>
+                </a:solidFill>
+                <a:latin typeface="Segoe UI" panose="020B0502040204020203" pitchFamily="34" charset="0"/>
+                <a:cs typeface="Segoe UI" panose="020B0502040204020203" pitchFamily="34" charset="0"/>
+              </a:rPr>
+              <a:t>office</a:t>
+            </a:r>
+            <a:r>
+              <a:rPr lang="en-US" dirty="0">
+                <a:solidFill>
+                  <a:prstClr val="black">
+                    <a:lumMod val="75000"/>
+                    <a:lumOff val="25000"/>
+                  </a:prstClr>
+                </a:solidFill>
+                <a:latin typeface="Segoe UI" panose="020B0502040204020203" pitchFamily="34" charset="0"/>
+                <a:cs typeface="Segoe UI" panose="020B0502040204020203" pitchFamily="34" charset="0"/>
+              </a:rPr>
+              <a:t> in the following phrase: </a:t>
+            </a:r>
+            <a:r>
+              <a:rPr lang="en-US" sz="1800" dirty="0">
+                <a:solidFill>
+                  <a:prstClr val="black">
+                    <a:lumMod val="75000"/>
+                    <a:lumOff val="25000"/>
+                  </a:prstClr>
+                </a:solidFill>
+                <a:latin typeface="Segoe UI" panose="020B0502040204020203" pitchFamily="34" charset="0"/>
+                <a:cs typeface="Segoe UI" panose="020B0502040204020203" pitchFamily="34" charset="0"/>
+              </a:rPr>
+              <a:t>office furniture</a:t>
+            </a:r>
+          </a:p>
+        </p:txBody>
+      </p:sp>
+      <p:grpSp>
+        <p:nvGrpSpPr>
+          <p:cNvPr id="36" name="Group 35" descr="Small circle with number 2 inside  indicating step 2"/>
+          <p:cNvGrpSpPr/>
+          <p:nvPr/>
+        </p:nvGrpSpPr>
+        <p:grpSpPr bwMode="blackWhite">
+          <a:xfrm>
+            <a:off x="4249102" y="5233381"/>
+            <a:ext cx="558179" cy="409838"/>
+            <a:chOff x="6953426" y="711274"/>
+            <a:chExt cx="558179" cy="409838"/>
+          </a:xfrm>
+        </p:grpSpPr>
+        <p:sp>
+          <p:nvSpPr>
+            <p:cNvPr id="37" name="Oval 36" descr="Small circle"/>
+            <p:cNvSpPr/>
+            <p:nvPr/>
+          </p:nvSpPr>
+          <p:spPr bwMode="blackWhite">
+            <a:xfrm>
+              <a:off x="7025069" y="711274"/>
+              <a:ext cx="409838" cy="409838"/>
+            </a:xfrm>
+            <a:prstGeom prst="ellipse">
+              <a:avLst/>
+            </a:prstGeom>
+            <a:solidFill>
+              <a:srgbClr val="D24726"/>
+            </a:solidFill>
+            <a:ln>
+              <a:noFill/>
+            </a:ln>
+          </p:spPr>
+          <p:style>
+            <a:lnRef idx="2">
+              <a:schemeClr val="accent1">
+                <a:shade val="50000"/>
+              </a:schemeClr>
+            </a:lnRef>
+            <a:fillRef idx="1">
+              <a:schemeClr val="accent1"/>
+            </a:fillRef>
+            <a:effectRef idx="0">
+              <a:schemeClr val="accent1"/>
+            </a:effectRef>
+            <a:fontRef idx="minor">
+              <a:schemeClr val="lt1"/>
+            </a:fontRef>
+          </p:style>
+          <p:txBody>
+            <a:bodyPr rtlCol="0" anchor="ctr"/>
+            <a:lstStyle/>
+            <a:p>
+              <a:pPr algn="ctr"/>
+              <a:endParaRPr lang="en-US" dirty="0"/>
+            </a:p>
+          </p:txBody>
+        </p:sp>
+        <p:sp>
+          <p:nvSpPr>
+            <p:cNvPr id="38" name="TextBox 37" descr="Number 2"/>
+            <p:cNvSpPr txBox="1"/>
+            <p:nvPr/>
+          </p:nvSpPr>
+          <p:spPr bwMode="blackWhite">
+            <a:xfrm>
+              <a:off x="6953426" y="727564"/>
+              <a:ext cx="558179" cy="369332"/>
+            </a:xfrm>
+            <a:prstGeom prst="rect">
+              <a:avLst/>
+            </a:prstGeom>
+            <a:noFill/>
+          </p:spPr>
+          <p:txBody>
+            <a:bodyPr wrap="square" rtlCol="0">
+              <a:spAutoFit/>
+            </a:bodyPr>
+            <a:lstStyle/>
+            <a:p>
+              <a:pPr algn="ctr"/>
+              <a:r>
+                <a:rPr lang="en-US" dirty="0">
+                  <a:solidFill>
+                    <a:schemeClr val="bg1"/>
+                  </a:solidFill>
+                  <a:latin typeface="Segoe UI Semibold" panose="020B0702040204020203" pitchFamily="34" charset="0"/>
+                  <a:cs typeface="Segoe UI Semibold" panose="020B0702040204020203" pitchFamily="34" charset="0"/>
+                </a:rPr>
+                <a:t>2</a:t>
+              </a:r>
+            </a:p>
+          </p:txBody>
+        </p:sp>
+      </p:grpSp>
+      <p:sp>
+        <p:nvSpPr>
+          <p:cNvPr id="43" name="Content Placeholder 17"/>
+          <p:cNvSpPr txBox="1">
+            <a:spLocks/>
+          </p:cNvSpPr>
+          <p:nvPr/>
+        </p:nvSpPr>
+        <p:spPr>
+          <a:xfrm>
+            <a:off x="4747855" y="5273573"/>
+            <a:ext cx="3106367" cy="1324053"/>
+          </a:xfrm>
+          <a:prstGeom prst="rect">
+            <a:avLst/>
+          </a:prstGeom>
+        </p:spPr>
+        <p:txBody>
+          <a:bodyPr vert="horz" lIns="91440" tIns="45720" rIns="91440" bIns="45720" rtlCol="0">
+            <a:normAutofit/>
+          </a:bodyPr>
+          <a:lstStyle>
+            <a:lvl1pPr marL="228600" indent="-228600" algn="l" defTabSz="914400" rtl="0" eaLnBrk="1" latinLnBrk="0" hangingPunct="1">
+              <a:lnSpc>
+                <a:spcPts val="1800"/>
+              </a:lnSpc>
+              <a:spcBef>
+                <a:spcPts val="1000"/>
+              </a:spcBef>
+              <a:spcAft>
+                <a:spcPts val="1000"/>
+              </a:spcAft>
+              <a:buFont typeface="Arial" panose="020B0604020202020204" pitchFamily="34" charset="0"/>
+              <a:buChar char="•"/>
+              <a:defRPr lang="en-US" sz="1200" kern="1200" smtClean="0">
+                <a:solidFill>
+                  <a:schemeClr val="tx1">
+                    <a:lumMod val="75000"/>
+                    <a:lumOff val="25000"/>
+                  </a:schemeClr>
+                </a:solidFill>
+                <a:latin typeface="+mn-lt"/>
+                <a:ea typeface="+mn-ea"/>
+                <a:cs typeface="+mn-cs"/>
+              </a:defRPr>
+            </a:lvl1pPr>
+            <a:lvl2pPr marL="685800" indent="-228600" algn="l" defTabSz="914400" rtl="0" eaLnBrk="1" latinLnBrk="0" hangingPunct="1">
+              <a:lnSpc>
+                <a:spcPts val="1800"/>
+              </a:lnSpc>
+              <a:spcBef>
+                <a:spcPts val="1000"/>
+              </a:spcBef>
+              <a:spcAft>
+                <a:spcPts val="1000"/>
+              </a:spcAft>
+              <a:buFont typeface="Arial" panose="020B0604020202020204" pitchFamily="34" charset="0"/>
+              <a:buChar char="•"/>
+              <a:defRPr lang="en-US" sz="1200" kern="1200" smtClean="0">
+                <a:solidFill>
+                  <a:schemeClr val="tx1">
+                    <a:lumMod val="75000"/>
+                    <a:lumOff val="25000"/>
+                  </a:schemeClr>
+                </a:solidFill>
+                <a:latin typeface="+mn-lt"/>
+                <a:ea typeface="+mn-ea"/>
+                <a:cs typeface="+mn-cs"/>
+              </a:defRPr>
+            </a:lvl2pPr>
+            <a:lvl3pPr marL="1143000" indent="-228600" algn="l" defTabSz="914400" rtl="0" eaLnBrk="1" latinLnBrk="0" hangingPunct="1">
+              <a:lnSpc>
+                <a:spcPts val="1800"/>
+              </a:lnSpc>
+              <a:spcBef>
+                <a:spcPts val="1000"/>
+              </a:spcBef>
+              <a:spcAft>
+                <a:spcPts val="1000"/>
+              </a:spcAft>
+              <a:buFont typeface="Arial" panose="020B0604020202020204" pitchFamily="34" charset="0"/>
+              <a:buChar char="•"/>
+              <a:defRPr lang="en-US" sz="1200" kern="1200" smtClean="0">
+                <a:solidFill>
+                  <a:schemeClr val="tx1">
+                    <a:lumMod val="75000"/>
+                    <a:lumOff val="25000"/>
+                  </a:schemeClr>
+                </a:solidFill>
+                <a:latin typeface="+mn-lt"/>
+                <a:ea typeface="+mn-ea"/>
+                <a:cs typeface="+mn-cs"/>
+              </a:defRPr>
+            </a:lvl3pPr>
+            <a:lvl4pPr marL="1600200" indent="-228600" algn="l" defTabSz="914400" rtl="0" eaLnBrk="1" latinLnBrk="0" hangingPunct="1">
+              <a:lnSpc>
+                <a:spcPts val="1800"/>
+              </a:lnSpc>
+              <a:spcBef>
+                <a:spcPts val="1000"/>
+              </a:spcBef>
+              <a:spcAft>
+                <a:spcPts val="1000"/>
+              </a:spcAft>
+              <a:buFont typeface="Arial" panose="020B0604020202020204" pitchFamily="34" charset="0"/>
+              <a:buChar char="•"/>
+              <a:defRPr lang="en-US" sz="1200" kern="1200" smtClean="0">
+                <a:solidFill>
+                  <a:schemeClr val="tx1">
+                    <a:lumMod val="75000"/>
+                    <a:lumOff val="25000"/>
+                  </a:schemeClr>
+                </a:solidFill>
+                <a:latin typeface="+mn-lt"/>
+                <a:ea typeface="+mn-ea"/>
+                <a:cs typeface="+mn-cs"/>
+              </a:defRPr>
+            </a:lvl4pPr>
+            <a:lvl5pPr marL="2057400" indent="-228600" algn="l" defTabSz="914400" rtl="0" eaLnBrk="1" latinLnBrk="0" hangingPunct="1">
+              <a:lnSpc>
+                <a:spcPts val="1800"/>
+              </a:lnSpc>
+              <a:spcBef>
+                <a:spcPts val="1000"/>
+              </a:spcBef>
+              <a:spcAft>
+                <a:spcPts val="1000"/>
+              </a:spcAft>
+              <a:buFont typeface="Arial" panose="020B0604020202020204" pitchFamily="34" charset="0"/>
+              <a:buChar char="•"/>
+              <a:defRPr lang="en-US" sz="1200" kern="1200">
+                <a:solidFill>
+                  <a:schemeClr val="tx1">
+                    <a:lumMod val="75000"/>
+                    <a:lumOff val="25000"/>
+                  </a:schemeClr>
+                </a:solidFill>
+                <a:latin typeface="+mn-lt"/>
+                <a:ea typeface="+mn-ea"/>
+                <a:cs typeface="+mn-cs"/>
+              </a:defRPr>
+            </a:lvl5pPr>
+            <a:lvl6pPr marL="2514600" indent="-228600" algn="l" defTabSz="914400" rtl="0" eaLnBrk="1" latinLnBrk="0" hangingPunct="1">
+              <a:lnSpc>
+                <a:spcPct val="90000"/>
+              </a:lnSpc>
+              <a:spcBef>
+                <a:spcPct val="30000"/>
+              </a:spcBef>
+              <a:buFont typeface="Arial" panose="020B0604020202020204" pitchFamily="34" charset="0"/>
+              <a:buChar char="•"/>
+              <a:defRPr sz="1800" kern="1200">
+                <a:solidFill>
+                  <a:schemeClr val="tx1"/>
+                </a:solidFill>
+                <a:latin typeface="+mn-lt"/>
+                <a:ea typeface="+mn-ea"/>
+                <a:cs typeface="+mn-cs"/>
+              </a:defRPr>
+            </a:lvl6pPr>
+            <a:lvl7pPr marL="2971800" indent="-228600" algn="l" defTabSz="914400" rtl="0" eaLnBrk="1" latinLnBrk="0" hangingPunct="1">
+              <a:lnSpc>
+                <a:spcPct val="90000"/>
+              </a:lnSpc>
+              <a:spcBef>
+                <a:spcPct val="30000"/>
+              </a:spcBef>
+              <a:buFont typeface="Arial" panose="020B0604020202020204" pitchFamily="34" charset="0"/>
+              <a:buChar char="•"/>
+              <a:defRPr sz="1800" kern="1200">
+                <a:solidFill>
+                  <a:schemeClr val="tx1"/>
+                </a:solidFill>
+                <a:latin typeface="+mn-lt"/>
+                <a:ea typeface="+mn-ea"/>
+                <a:cs typeface="+mn-cs"/>
+              </a:defRPr>
+            </a:lvl7pPr>
+            <a:lvl8pPr marL="3429000" indent="-228600" algn="l" defTabSz="914400" rtl="0" eaLnBrk="1" latinLnBrk="0" hangingPunct="1">
+              <a:lnSpc>
+                <a:spcPct val="90000"/>
+              </a:lnSpc>
+              <a:spcBef>
+                <a:spcPct val="30000"/>
+              </a:spcBef>
+              <a:buFont typeface="Arial" panose="020B0604020202020204" pitchFamily="34" charset="0"/>
+              <a:buChar char="•"/>
+              <a:defRPr sz="1800" kern="1200">
+                <a:solidFill>
+                  <a:schemeClr val="tx1"/>
+                </a:solidFill>
+                <a:latin typeface="+mn-lt"/>
+                <a:ea typeface="+mn-ea"/>
+                <a:cs typeface="+mn-cs"/>
+              </a:defRPr>
+            </a:lvl8pPr>
+            <a:lvl9pPr marL="3886200" indent="-228600" algn="l" defTabSz="914400" rtl="0" eaLnBrk="1" latinLnBrk="0" hangingPunct="1">
+              <a:lnSpc>
+                <a:spcPct val="90000"/>
+              </a:lnSpc>
+              <a:spcBef>
+                <a:spcPct val="30000"/>
+              </a:spcBef>
+              <a:buFont typeface="Arial" panose="020B0604020202020204" pitchFamily="34" charset="0"/>
+              <a:buChar char="•"/>
+              <a:defRPr sz="1800" kern="1200">
+                <a:solidFill>
+                  <a:schemeClr val="tx1"/>
+                </a:solidFill>
+                <a:latin typeface="+mn-lt"/>
+                <a:ea typeface="+mn-ea"/>
+                <a:cs typeface="+mn-cs"/>
+              </a:defRPr>
+            </a:lvl9pPr>
+          </a:lstStyle>
+          <a:p>
+            <a:pPr marL="0" indent="0">
+              <a:spcAft>
+                <a:spcPts val="2000"/>
+              </a:spcAft>
+              <a:buNone/>
+            </a:pPr>
+            <a:r>
+              <a:rPr lang="en-US" dirty="0">
+                <a:solidFill>
+                  <a:prstClr val="black">
+                    <a:lumMod val="75000"/>
+                    <a:lumOff val="25000"/>
+                  </a:prstClr>
+                </a:solidFill>
+                <a:latin typeface="Segoe UI" panose="020B0502040204020203" pitchFamily="34" charset="0"/>
+                <a:cs typeface="Segoe UI" panose="020B0502040204020203" pitchFamily="34" charset="0"/>
+              </a:rPr>
+              <a:t>Choose </a:t>
+            </a:r>
+            <a:r>
+              <a:rPr lang="en-US" dirty="0">
+                <a:solidFill>
+                  <a:srgbClr val="D24726"/>
+                </a:solidFill>
+                <a:latin typeface="Segoe UI Semibold" panose="020B0702040204020203" pitchFamily="34" charset="0"/>
+                <a:cs typeface="Segoe UI Semibold" panose="020B0702040204020203" pitchFamily="34" charset="0"/>
+              </a:rPr>
+              <a:t>Smart</a:t>
+            </a:r>
+            <a:r>
+              <a:rPr lang="en-US" dirty="0">
+                <a:solidFill>
+                  <a:prstClr val="black">
+                    <a:lumMod val="75000"/>
+                    <a:lumOff val="25000"/>
+                  </a:prstClr>
+                </a:solidFill>
+                <a:cs typeface="Segoe UI"/>
+              </a:rPr>
+              <a:t> </a:t>
+            </a:r>
+            <a:r>
+              <a:rPr lang="en-US" dirty="0">
+                <a:solidFill>
+                  <a:srgbClr val="D24726"/>
+                </a:solidFill>
+                <a:latin typeface="Segoe UI Semibold" panose="020B0702040204020203" pitchFamily="34" charset="0"/>
+                <a:cs typeface="Segoe UI Semibold" panose="020B0702040204020203" pitchFamily="34" charset="0"/>
+              </a:rPr>
+              <a:t>Lookup</a:t>
+            </a:r>
+            <a:r>
+              <a:rPr lang="en-US" dirty="0">
+                <a:latin typeface="Segoe UI" panose="020B0502040204020203" pitchFamily="34" charset="0"/>
+                <a:cs typeface="Segoe UI" panose="020B0502040204020203" pitchFamily="34" charset="0"/>
+              </a:rPr>
+              <a:t>, and notice that results are contextual for that phrase, not </a:t>
+            </a:r>
+            <a:r>
+              <a:rPr lang="en-US" sz="1800" dirty="0">
+                <a:latin typeface="Segoe UI" panose="020B0502040204020203" pitchFamily="34" charset="0"/>
+                <a:cs typeface="Segoe UI" panose="020B0502040204020203" pitchFamily="34" charset="0"/>
+              </a:rPr>
+              <a:t>Microsoft Office apps</a:t>
+            </a:r>
+            <a:r>
+              <a:rPr lang="en-US" dirty="0">
+                <a:latin typeface="Segoe UI" panose="020B0502040204020203" pitchFamily="34" charset="0"/>
+                <a:cs typeface="Segoe UI" panose="020B0502040204020203" pitchFamily="34" charset="0"/>
+              </a:rPr>
+              <a:t>.</a:t>
+            </a:r>
+            <a:endParaRPr lang="en-US" dirty="0">
+              <a:solidFill>
+                <a:srgbClr val="D24726"/>
+              </a:solidFill>
+              <a:latin typeface="Segoe UI" panose="020B0502040204020203" pitchFamily="34" charset="0"/>
+              <a:cs typeface="Segoe UI" panose="020B0502040204020203" pitchFamily="34" charset="0"/>
+            </a:endParaRPr>
+          </a:p>
+        </p:txBody>
+      </p:sp>
+      <p:grpSp>
+        <p:nvGrpSpPr>
+          <p:cNvPr id="39" name="Group 38" descr="Small circle with number 3 inside  indicating step 3"/>
+          <p:cNvGrpSpPr/>
+          <p:nvPr/>
+        </p:nvGrpSpPr>
+        <p:grpSpPr bwMode="blackWhite">
+          <a:xfrm>
+            <a:off x="7930921" y="5233381"/>
+            <a:ext cx="558179" cy="409838"/>
+            <a:chOff x="6953426" y="711274"/>
+            <a:chExt cx="558179" cy="409838"/>
+          </a:xfrm>
+        </p:grpSpPr>
+        <p:sp>
+          <p:nvSpPr>
+            <p:cNvPr id="40" name="Oval 39" descr="Small circle"/>
+            <p:cNvSpPr/>
+            <p:nvPr/>
+          </p:nvSpPr>
+          <p:spPr bwMode="blackWhite">
+            <a:xfrm>
+              <a:off x="7025069" y="711274"/>
+              <a:ext cx="409838" cy="409838"/>
+            </a:xfrm>
+            <a:prstGeom prst="ellipse">
+              <a:avLst/>
+            </a:prstGeom>
+            <a:solidFill>
+              <a:srgbClr val="D24726"/>
+            </a:solidFill>
+            <a:ln>
+              <a:noFill/>
+            </a:ln>
+          </p:spPr>
+          <p:style>
+            <a:lnRef idx="2">
+              <a:schemeClr val="accent1">
+                <a:shade val="50000"/>
+              </a:schemeClr>
+            </a:lnRef>
+            <a:fillRef idx="1">
+              <a:schemeClr val="accent1"/>
+            </a:fillRef>
+            <a:effectRef idx="0">
+              <a:schemeClr val="accent1"/>
+            </a:effectRef>
+            <a:fontRef idx="minor">
+              <a:schemeClr val="lt1"/>
+            </a:fontRef>
+          </p:style>
+          <p:txBody>
+            <a:bodyPr rtlCol="0" anchor="ctr"/>
+            <a:lstStyle/>
+            <a:p>
+              <a:pPr algn="ctr"/>
+              <a:endParaRPr lang="en-US" dirty="0"/>
+            </a:p>
+          </p:txBody>
+        </p:sp>
+        <p:sp>
+          <p:nvSpPr>
+            <p:cNvPr id="41" name="TextBox 40" descr="Number 3"/>
+            <p:cNvSpPr txBox="1"/>
+            <p:nvPr/>
+          </p:nvSpPr>
+          <p:spPr bwMode="blackWhite">
+            <a:xfrm>
+              <a:off x="6953426" y="727564"/>
+              <a:ext cx="558179" cy="369332"/>
+            </a:xfrm>
+            <a:prstGeom prst="rect">
+              <a:avLst/>
+            </a:prstGeom>
+            <a:noFill/>
+          </p:spPr>
+          <p:txBody>
+            <a:bodyPr wrap="square" rtlCol="0">
+              <a:spAutoFit/>
+            </a:bodyPr>
+            <a:lstStyle/>
+            <a:p>
+              <a:pPr algn="ctr"/>
+              <a:r>
+                <a:rPr lang="en-US" dirty="0">
+                  <a:solidFill>
+                    <a:schemeClr val="bg1"/>
+                  </a:solidFill>
+                  <a:latin typeface="Segoe UI Semibold" panose="020B0702040204020203" pitchFamily="34" charset="0"/>
+                  <a:cs typeface="Segoe UI Semibold" panose="020B0702040204020203" pitchFamily="34" charset="0"/>
+                </a:rPr>
+                <a:t>3</a:t>
+              </a:r>
+            </a:p>
+          </p:txBody>
+        </p:sp>
+      </p:grpSp>
+      <p:sp>
+        <p:nvSpPr>
+          <p:cNvPr id="44" name="Content Placeholder 17"/>
+          <p:cNvSpPr txBox="1">
+            <a:spLocks/>
+          </p:cNvSpPr>
+          <p:nvPr/>
+        </p:nvSpPr>
+        <p:spPr>
+          <a:xfrm>
+            <a:off x="8429668" y="5273573"/>
+            <a:ext cx="3107336" cy="1341886"/>
+          </a:xfrm>
+          <a:prstGeom prst="rect">
+            <a:avLst/>
+          </a:prstGeom>
+        </p:spPr>
+        <p:txBody>
+          <a:bodyPr vert="horz" lIns="91440" tIns="45720" rIns="91440" bIns="45720" rtlCol="0">
+            <a:normAutofit/>
+          </a:bodyPr>
+          <a:lstStyle>
+            <a:lvl1pPr marL="228600" indent="-228600" algn="l" defTabSz="914400" rtl="0" eaLnBrk="1" latinLnBrk="0" hangingPunct="1">
+              <a:lnSpc>
+                <a:spcPts val="1800"/>
+              </a:lnSpc>
+              <a:spcBef>
+                <a:spcPts val="1000"/>
+              </a:spcBef>
+              <a:spcAft>
+                <a:spcPts val="1000"/>
+              </a:spcAft>
+              <a:buFont typeface="Arial" panose="020B0604020202020204" pitchFamily="34" charset="0"/>
+              <a:buChar char="•"/>
+              <a:defRPr lang="en-US" sz="1200" kern="1200" smtClean="0">
+                <a:solidFill>
+                  <a:schemeClr val="tx1">
+                    <a:lumMod val="75000"/>
+                    <a:lumOff val="25000"/>
+                  </a:schemeClr>
+                </a:solidFill>
+                <a:latin typeface="+mn-lt"/>
+                <a:ea typeface="+mn-ea"/>
+                <a:cs typeface="+mn-cs"/>
+              </a:defRPr>
+            </a:lvl1pPr>
+            <a:lvl2pPr marL="685800" indent="-228600" algn="l" defTabSz="914400" rtl="0" eaLnBrk="1" latinLnBrk="0" hangingPunct="1">
+              <a:lnSpc>
+                <a:spcPts val="1800"/>
+              </a:lnSpc>
+              <a:spcBef>
+                <a:spcPts val="1000"/>
+              </a:spcBef>
+              <a:spcAft>
+                <a:spcPts val="1000"/>
+              </a:spcAft>
+              <a:buFont typeface="Arial" panose="020B0604020202020204" pitchFamily="34" charset="0"/>
+              <a:buChar char="•"/>
+              <a:defRPr lang="en-US" sz="1200" kern="1200" smtClean="0">
+                <a:solidFill>
+                  <a:schemeClr val="tx1">
+                    <a:lumMod val="75000"/>
+                    <a:lumOff val="25000"/>
+                  </a:schemeClr>
+                </a:solidFill>
+                <a:latin typeface="+mn-lt"/>
+                <a:ea typeface="+mn-ea"/>
+                <a:cs typeface="+mn-cs"/>
+              </a:defRPr>
+            </a:lvl2pPr>
+            <a:lvl3pPr marL="1143000" indent="-228600" algn="l" defTabSz="914400" rtl="0" eaLnBrk="1" latinLnBrk="0" hangingPunct="1">
+              <a:lnSpc>
+                <a:spcPts val="1800"/>
+              </a:lnSpc>
+              <a:spcBef>
+                <a:spcPts val="1000"/>
+              </a:spcBef>
+              <a:spcAft>
+                <a:spcPts val="1000"/>
+              </a:spcAft>
+              <a:buFont typeface="Arial" panose="020B0604020202020204" pitchFamily="34" charset="0"/>
+              <a:buChar char="•"/>
+              <a:defRPr lang="en-US" sz="1200" kern="1200" smtClean="0">
+                <a:solidFill>
+                  <a:schemeClr val="tx1">
+                    <a:lumMod val="75000"/>
+                    <a:lumOff val="25000"/>
+                  </a:schemeClr>
+                </a:solidFill>
+                <a:latin typeface="+mn-lt"/>
+                <a:ea typeface="+mn-ea"/>
+                <a:cs typeface="+mn-cs"/>
+              </a:defRPr>
+            </a:lvl3pPr>
+            <a:lvl4pPr marL="1600200" indent="-228600" algn="l" defTabSz="914400" rtl="0" eaLnBrk="1" latinLnBrk="0" hangingPunct="1">
+              <a:lnSpc>
+                <a:spcPts val="1800"/>
+              </a:lnSpc>
+              <a:spcBef>
+                <a:spcPts val="1000"/>
+              </a:spcBef>
+              <a:spcAft>
+                <a:spcPts val="1000"/>
+              </a:spcAft>
+              <a:buFont typeface="Arial" panose="020B0604020202020204" pitchFamily="34" charset="0"/>
+              <a:buChar char="•"/>
+              <a:defRPr lang="en-US" sz="1200" kern="1200" smtClean="0">
+                <a:solidFill>
+                  <a:schemeClr val="tx1">
+                    <a:lumMod val="75000"/>
+                    <a:lumOff val="25000"/>
+                  </a:schemeClr>
+                </a:solidFill>
+                <a:latin typeface="+mn-lt"/>
+                <a:ea typeface="+mn-ea"/>
+                <a:cs typeface="+mn-cs"/>
+              </a:defRPr>
+            </a:lvl4pPr>
+            <a:lvl5pPr marL="2057400" indent="-228600" algn="l" defTabSz="914400" rtl="0" eaLnBrk="1" latinLnBrk="0" hangingPunct="1">
+              <a:lnSpc>
+                <a:spcPts val="1800"/>
+              </a:lnSpc>
+              <a:spcBef>
+                <a:spcPts val="1000"/>
+              </a:spcBef>
+              <a:spcAft>
+                <a:spcPts val="1000"/>
+              </a:spcAft>
+              <a:buFont typeface="Arial" panose="020B0604020202020204" pitchFamily="34" charset="0"/>
+              <a:buChar char="•"/>
+              <a:defRPr lang="en-US" sz="1200" kern="1200">
+                <a:solidFill>
+                  <a:schemeClr val="tx1">
+                    <a:lumMod val="75000"/>
+                    <a:lumOff val="25000"/>
+                  </a:schemeClr>
+                </a:solidFill>
+                <a:latin typeface="+mn-lt"/>
+                <a:ea typeface="+mn-ea"/>
+                <a:cs typeface="+mn-cs"/>
+              </a:defRPr>
+            </a:lvl5pPr>
+            <a:lvl6pPr marL="2514600" indent="-228600" algn="l" defTabSz="914400" rtl="0" eaLnBrk="1" latinLnBrk="0" hangingPunct="1">
+              <a:lnSpc>
+                <a:spcPct val="90000"/>
+              </a:lnSpc>
+              <a:spcBef>
+                <a:spcPct val="30000"/>
+              </a:spcBef>
+              <a:buFont typeface="Arial" panose="020B0604020202020204" pitchFamily="34" charset="0"/>
+              <a:buChar char="•"/>
+              <a:defRPr sz="1800" kern="1200">
+                <a:solidFill>
+                  <a:schemeClr val="tx1"/>
+                </a:solidFill>
+                <a:latin typeface="+mn-lt"/>
+                <a:ea typeface="+mn-ea"/>
+                <a:cs typeface="+mn-cs"/>
+              </a:defRPr>
+            </a:lvl6pPr>
+            <a:lvl7pPr marL="2971800" indent="-228600" algn="l" defTabSz="914400" rtl="0" eaLnBrk="1" latinLnBrk="0" hangingPunct="1">
+              <a:lnSpc>
+                <a:spcPct val="90000"/>
+              </a:lnSpc>
+              <a:spcBef>
+                <a:spcPct val="30000"/>
+              </a:spcBef>
+              <a:buFont typeface="Arial" panose="020B0604020202020204" pitchFamily="34" charset="0"/>
+              <a:buChar char="•"/>
+              <a:defRPr sz="1800" kern="1200">
+                <a:solidFill>
+                  <a:schemeClr val="tx1"/>
+                </a:solidFill>
+                <a:latin typeface="+mn-lt"/>
+                <a:ea typeface="+mn-ea"/>
+                <a:cs typeface="+mn-cs"/>
+              </a:defRPr>
+            </a:lvl7pPr>
+            <a:lvl8pPr marL="3429000" indent="-228600" algn="l" defTabSz="914400" rtl="0" eaLnBrk="1" latinLnBrk="0" hangingPunct="1">
+              <a:lnSpc>
+                <a:spcPct val="90000"/>
+              </a:lnSpc>
+              <a:spcBef>
+                <a:spcPct val="30000"/>
+              </a:spcBef>
+              <a:buFont typeface="Arial" panose="020B0604020202020204" pitchFamily="34" charset="0"/>
+              <a:buChar char="•"/>
+              <a:defRPr sz="1800" kern="1200">
+                <a:solidFill>
+                  <a:schemeClr val="tx1"/>
+                </a:solidFill>
+                <a:latin typeface="+mn-lt"/>
+                <a:ea typeface="+mn-ea"/>
+                <a:cs typeface="+mn-cs"/>
+              </a:defRPr>
+            </a:lvl8pPr>
+            <a:lvl9pPr marL="3886200" indent="-228600" algn="l" defTabSz="914400" rtl="0" eaLnBrk="1" latinLnBrk="0" hangingPunct="1">
+              <a:lnSpc>
+                <a:spcPct val="90000"/>
+              </a:lnSpc>
+              <a:spcBef>
+                <a:spcPct val="30000"/>
+              </a:spcBef>
+              <a:buFont typeface="Arial" panose="020B0604020202020204" pitchFamily="34" charset="0"/>
+              <a:buChar char="•"/>
+              <a:defRPr sz="1800" kern="1200">
+                <a:solidFill>
+                  <a:schemeClr val="tx1"/>
+                </a:solidFill>
+                <a:latin typeface="+mn-lt"/>
+                <a:ea typeface="+mn-ea"/>
+                <a:cs typeface="+mn-cs"/>
+              </a:defRPr>
+            </a:lvl9pPr>
+          </a:lstStyle>
+          <a:p>
+            <a:pPr marL="0" lvl="0" indent="0">
+              <a:spcAft>
+                <a:spcPts val="2000"/>
+              </a:spcAft>
+              <a:buNone/>
+            </a:pPr>
+            <a:r>
+              <a:rPr lang="en-US" dirty="0">
+                <a:latin typeface="Segoe UI" panose="020B0502040204020203" pitchFamily="34" charset="0"/>
+                <a:cs typeface="Segoe UI" panose="020B0502040204020203" pitchFamily="34" charset="0"/>
+              </a:rPr>
+              <a:t>Just for fun, try Smart Lookup again by right-clicking in the word </a:t>
+            </a:r>
+            <a:r>
+              <a:rPr lang="en-US" i="1" dirty="0">
+                <a:solidFill>
+                  <a:srgbClr val="D24726"/>
+                </a:solidFill>
+                <a:latin typeface="Segoe UI" panose="020B0502040204020203" pitchFamily="34" charset="0"/>
+                <a:cs typeface="Segoe UI" panose="020B0502040204020203" pitchFamily="34" charset="0"/>
+              </a:rPr>
+              <a:t>Office</a:t>
+            </a:r>
+            <a:r>
+              <a:rPr lang="en-US" dirty="0"/>
+              <a:t> </a:t>
+            </a:r>
+            <a:r>
+              <a:rPr lang="en-US" dirty="0">
+                <a:latin typeface="Segoe UI" panose="020B0502040204020203" pitchFamily="34" charset="0"/>
+                <a:cs typeface="Segoe UI" panose="020B0502040204020203" pitchFamily="34" charset="0"/>
+              </a:rPr>
+              <a:t>in Step 2.</a:t>
+            </a:r>
+          </a:p>
+          <a:p>
+            <a:pPr marL="0" indent="0">
+              <a:spcAft>
+                <a:spcPts val="2000"/>
+              </a:spcAft>
+              <a:buNone/>
+            </a:pPr>
+            <a:endParaRPr lang="en-US" dirty="0">
+              <a:solidFill>
+                <a:prstClr val="black">
+                  <a:lumMod val="75000"/>
+                  <a:lumOff val="25000"/>
+                </a:prstClr>
+              </a:solidFill>
+            </a:endParaRPr>
+          </a:p>
+        </p:txBody>
+      </p:sp>
+    </p:spTree>
+    <p:extLst>
+      <p:ext uri="{BB962C8B-B14F-4D97-AF65-F5344CB8AC3E}">
+        <p14:creationId xmlns:p14="http://schemas.microsoft.com/office/powerpoint/2010/main" val="1769326051"/>
+      </p:ext>
+    </p:extLst>
+  </p:cSld>
+  <p:clrMapOvr>
+    <a:masterClrMapping/>
+  </p:clrMapOvr>
+  <mc:AlternateContent xmlns:mc="http://schemas.openxmlformats.org/markup-compatibility/2006" xmlns:p14="http://schemas.microsoft.com/office/powerpoint/2010/main">
+    <mc:Choice Requires="p14">
+      <p:transition p14:dur="10"/>
+    </mc:Choice>
+    <mc:Fallback xmlns="">
+      <p:transition/>
+    </mc:Fallback>
+  </mc:AlternateContent>
+</p:sld>
+</file>
+
+<file path=ppt/slides/slide11.xml><?xml version="1.0" encoding="utf-8"?>
+<p:sld xmlns:a="http://schemas.openxmlformats.org/drawingml/2006/main" xmlns:r="http://schemas.openxmlformats.org/officeDocument/2006/relationships" xmlns:p="http://schemas.openxmlformats.org/presentationml/2006/main">
+  <p:cSld>
+    <p:spTree>
+      <p:nvGrpSpPr>
+        <p:cNvPr id="1" name=""/>
+        <p:cNvGrpSpPr/>
+        <p:nvPr/>
+      </p:nvGrpSpPr>
+      <p:grpSpPr>
+        <a:xfrm>
+          <a:off x="0" y="0"/>
+          <a:ext cx="0" cy="0"/>
+          <a:chOff x="0" y="0"/>
+          <a:chExt cx="0" cy="0"/>
+        </a:xfrm>
+      </p:grpSpPr>
+      <p:sp>
+        <p:nvSpPr>
           <p:cNvPr id="10" name="Title 9"/>
           <p:cNvSpPr>
             <a:spLocks noGrp="1"/>
@@ -4835,16 +6313,12 @@
               <a:t>역시 아는 만큼 보이는 법</a:t>
             </a:r>
             <a:r>
-              <a:rPr lang="en-US" altLang="ko-KR">
+              <a:rPr lang="en-US" altLang="ko-KR" dirty="0">
                 <a:latin typeface="Segoe UI" panose="020B0502040204020203" pitchFamily="34" charset="0"/>
                 <a:cs typeface="Segoe UI" panose="020B0502040204020203" pitchFamily="34" charset="0"/>
               </a:rPr>
               <a:t>.</a:t>
             </a:r>
-            <a:endParaRPr lang="en-US" altLang="ko-KR" dirty="0">
-              <a:latin typeface="Segoe UI" panose="020B0502040204020203" pitchFamily="34" charset="0"/>
-              <a:cs typeface="Segoe UI" panose="020B0502040204020203" pitchFamily="34" charset="0"/>
-            </a:endParaRPr>
           </a:p>
         </p:txBody>
       </p:sp>
@@ -4870,6 +6344,949 @@
 </file>
 
 <file path=ppt/slides/slide4.xml><?xml version="1.0" encoding="utf-8"?>
+<p:sld xmlns:a="http://schemas.openxmlformats.org/drawingml/2006/main" xmlns:r="http://schemas.openxmlformats.org/officeDocument/2006/relationships" xmlns:p="http://schemas.openxmlformats.org/presentationml/2006/main">
+  <p:cSld>
+    <p:spTree>
+      <p:nvGrpSpPr>
+        <p:cNvPr id="1" name=""/>
+        <p:cNvGrpSpPr/>
+        <p:nvPr/>
+      </p:nvGrpSpPr>
+      <p:grpSpPr>
+        <a:xfrm>
+          <a:off x="0" y="0"/>
+          <a:ext cx="0" cy="0"/>
+          <a:chOff x="0" y="0"/>
+          <a:chExt cx="0" cy="0"/>
+        </a:xfrm>
+      </p:grpSpPr>
+      <p:sp>
+        <p:nvSpPr>
+          <p:cNvPr id="8" name="Title 7"/>
+          <p:cNvSpPr>
+            <a:spLocks noGrp="1"/>
+          </p:cNvSpPr>
+          <p:nvPr>
+            <p:ph type="title"/>
+          </p:nvPr>
+        </p:nvSpPr>
+        <p:spPr/>
+        <p:txBody>
+          <a:bodyPr>
+            <a:noAutofit/>
+          </a:bodyPr>
+          <a:lstStyle/>
+          <a:p>
+            <a:r>
+              <a:rPr lang="ko-KR" altLang="en-US" dirty="0">
+                <a:latin typeface="Segoe UI Light" panose="020B0502040204020203" pitchFamily="34" charset="0"/>
+                <a:cs typeface="Segoe UI Light" panose="020B0502040204020203" pitchFamily="34" charset="0"/>
+              </a:rPr>
+              <a:t>백준 </a:t>
+            </a:r>
+            <a:r>
+              <a:rPr lang="en-US" altLang="ko-KR" dirty="0">
+                <a:latin typeface="Segoe UI Light" panose="020B0502040204020203" pitchFamily="34" charset="0"/>
+                <a:cs typeface="Segoe UI Light" panose="020B0502040204020203" pitchFamily="34" charset="0"/>
+              </a:rPr>
+              <a:t>1922</a:t>
+            </a:r>
+            <a:br>
+              <a:rPr lang="en-US" altLang="ko-KR" dirty="0">
+                <a:latin typeface="Segoe UI Light" panose="020B0502040204020203" pitchFamily="34" charset="0"/>
+                <a:cs typeface="Segoe UI Light" panose="020B0502040204020203" pitchFamily="34" charset="0"/>
+              </a:rPr>
+            </a:br>
+            <a:r>
+              <a:rPr lang="en-US" altLang="ko-KR" dirty="0">
+                <a:hlinkClick r:id="rId2"/>
+              </a:rPr>
+              <a:t>https://www.acmicpc.net/problem/1922</a:t>
+            </a:r>
+            <a:r>
+              <a:rPr lang="en-US" altLang="ko-KR" dirty="0"/>
+              <a:t> </a:t>
+            </a:r>
+            <a:endParaRPr lang="en-US" dirty="0">
+              <a:latin typeface="Segoe UI Light" panose="020B0502040204020203" pitchFamily="34" charset="0"/>
+              <a:cs typeface="Segoe UI Light" panose="020B0502040204020203" pitchFamily="34" charset="0"/>
+            </a:endParaRPr>
+          </a:p>
+        </p:txBody>
+      </p:sp>
+      <p:sp>
+        <p:nvSpPr>
+          <p:cNvPr id="38" name="Content Placeholder 17"/>
+          <p:cNvSpPr txBox="1">
+            <a:spLocks/>
+          </p:cNvSpPr>
+          <p:nvPr/>
+        </p:nvSpPr>
+        <p:spPr>
+          <a:xfrm>
+            <a:off x="541610" y="1524708"/>
+            <a:ext cx="4321704" cy="4657652"/>
+          </a:xfrm>
+          <a:prstGeom prst="rect">
+            <a:avLst/>
+          </a:prstGeom>
+        </p:spPr>
+        <p:txBody>
+          <a:bodyPr vert="horz" lIns="91440" tIns="45720" rIns="91440" bIns="45720" rtlCol="0">
+            <a:normAutofit/>
+          </a:bodyPr>
+          <a:lstStyle>
+            <a:lvl1pPr marL="228600" indent="-228600" algn="l" defTabSz="914400" rtl="0" eaLnBrk="1" latinLnBrk="0" hangingPunct="1">
+              <a:lnSpc>
+                <a:spcPts val="1800"/>
+              </a:lnSpc>
+              <a:spcBef>
+                <a:spcPts val="1000"/>
+              </a:spcBef>
+              <a:spcAft>
+                <a:spcPts val="1000"/>
+              </a:spcAft>
+              <a:buFont typeface="Arial" panose="020B0604020202020204" pitchFamily="34" charset="0"/>
+              <a:buChar char="•"/>
+              <a:defRPr lang="en-US" sz="1200" kern="1200" smtClean="0">
+                <a:solidFill>
+                  <a:schemeClr val="tx1">
+                    <a:lumMod val="75000"/>
+                    <a:lumOff val="25000"/>
+                  </a:schemeClr>
+                </a:solidFill>
+                <a:latin typeface="+mn-lt"/>
+                <a:ea typeface="+mn-ea"/>
+                <a:cs typeface="+mn-cs"/>
+              </a:defRPr>
+            </a:lvl1pPr>
+            <a:lvl2pPr marL="685800" indent="-228600" algn="l" defTabSz="914400" rtl="0" eaLnBrk="1" latinLnBrk="0" hangingPunct="1">
+              <a:lnSpc>
+                <a:spcPts val="1800"/>
+              </a:lnSpc>
+              <a:spcBef>
+                <a:spcPts val="1000"/>
+              </a:spcBef>
+              <a:spcAft>
+                <a:spcPts val="1000"/>
+              </a:spcAft>
+              <a:buFont typeface="Arial" panose="020B0604020202020204" pitchFamily="34" charset="0"/>
+              <a:buChar char="•"/>
+              <a:defRPr lang="en-US" sz="1200" kern="1200" smtClean="0">
+                <a:solidFill>
+                  <a:schemeClr val="tx1">
+                    <a:lumMod val="75000"/>
+                    <a:lumOff val="25000"/>
+                  </a:schemeClr>
+                </a:solidFill>
+                <a:latin typeface="+mn-lt"/>
+                <a:ea typeface="+mn-ea"/>
+                <a:cs typeface="+mn-cs"/>
+              </a:defRPr>
+            </a:lvl2pPr>
+            <a:lvl3pPr marL="1143000" indent="-228600" algn="l" defTabSz="914400" rtl="0" eaLnBrk="1" latinLnBrk="0" hangingPunct="1">
+              <a:lnSpc>
+                <a:spcPts val="1800"/>
+              </a:lnSpc>
+              <a:spcBef>
+                <a:spcPts val="1000"/>
+              </a:spcBef>
+              <a:spcAft>
+                <a:spcPts val="1000"/>
+              </a:spcAft>
+              <a:buFont typeface="Arial" panose="020B0604020202020204" pitchFamily="34" charset="0"/>
+              <a:buChar char="•"/>
+              <a:defRPr lang="en-US" sz="1200" kern="1200" smtClean="0">
+                <a:solidFill>
+                  <a:schemeClr val="tx1">
+                    <a:lumMod val="75000"/>
+                    <a:lumOff val="25000"/>
+                  </a:schemeClr>
+                </a:solidFill>
+                <a:latin typeface="+mn-lt"/>
+                <a:ea typeface="+mn-ea"/>
+                <a:cs typeface="+mn-cs"/>
+              </a:defRPr>
+            </a:lvl3pPr>
+            <a:lvl4pPr marL="1600200" indent="-228600" algn="l" defTabSz="914400" rtl="0" eaLnBrk="1" latinLnBrk="0" hangingPunct="1">
+              <a:lnSpc>
+                <a:spcPts val="1800"/>
+              </a:lnSpc>
+              <a:spcBef>
+                <a:spcPts val="1000"/>
+              </a:spcBef>
+              <a:spcAft>
+                <a:spcPts val="1000"/>
+              </a:spcAft>
+              <a:buFont typeface="Arial" panose="020B0604020202020204" pitchFamily="34" charset="0"/>
+              <a:buChar char="•"/>
+              <a:defRPr lang="en-US" sz="1200" kern="1200" smtClean="0">
+                <a:solidFill>
+                  <a:schemeClr val="tx1">
+                    <a:lumMod val="75000"/>
+                    <a:lumOff val="25000"/>
+                  </a:schemeClr>
+                </a:solidFill>
+                <a:latin typeface="+mn-lt"/>
+                <a:ea typeface="+mn-ea"/>
+                <a:cs typeface="+mn-cs"/>
+              </a:defRPr>
+            </a:lvl4pPr>
+            <a:lvl5pPr marL="2057400" indent="-228600" algn="l" defTabSz="914400" rtl="0" eaLnBrk="1" latinLnBrk="0" hangingPunct="1">
+              <a:lnSpc>
+                <a:spcPts val="1800"/>
+              </a:lnSpc>
+              <a:spcBef>
+                <a:spcPts val="1000"/>
+              </a:spcBef>
+              <a:spcAft>
+                <a:spcPts val="1000"/>
+              </a:spcAft>
+              <a:buFont typeface="Arial" panose="020B0604020202020204" pitchFamily="34" charset="0"/>
+              <a:buChar char="•"/>
+              <a:defRPr lang="en-US" sz="1200" kern="1200">
+                <a:solidFill>
+                  <a:schemeClr val="tx1">
+                    <a:lumMod val="75000"/>
+                    <a:lumOff val="25000"/>
+                  </a:schemeClr>
+                </a:solidFill>
+                <a:latin typeface="+mn-lt"/>
+                <a:ea typeface="+mn-ea"/>
+                <a:cs typeface="+mn-cs"/>
+              </a:defRPr>
+            </a:lvl5pPr>
+            <a:lvl6pPr marL="2514600" indent="-228600" algn="l" defTabSz="914400" rtl="0" eaLnBrk="1" latinLnBrk="0" hangingPunct="1">
+              <a:lnSpc>
+                <a:spcPct val="90000"/>
+              </a:lnSpc>
+              <a:spcBef>
+                <a:spcPct val="30000"/>
+              </a:spcBef>
+              <a:buFont typeface="Arial" panose="020B0604020202020204" pitchFamily="34" charset="0"/>
+              <a:buChar char="•"/>
+              <a:defRPr sz="1800" kern="1200">
+                <a:solidFill>
+                  <a:schemeClr val="tx1"/>
+                </a:solidFill>
+                <a:latin typeface="+mn-lt"/>
+                <a:ea typeface="+mn-ea"/>
+                <a:cs typeface="+mn-cs"/>
+              </a:defRPr>
+            </a:lvl6pPr>
+            <a:lvl7pPr marL="2971800" indent="-228600" algn="l" defTabSz="914400" rtl="0" eaLnBrk="1" latinLnBrk="0" hangingPunct="1">
+              <a:lnSpc>
+                <a:spcPct val="90000"/>
+              </a:lnSpc>
+              <a:spcBef>
+                <a:spcPct val="30000"/>
+              </a:spcBef>
+              <a:buFont typeface="Arial" panose="020B0604020202020204" pitchFamily="34" charset="0"/>
+              <a:buChar char="•"/>
+              <a:defRPr sz="1800" kern="1200">
+                <a:solidFill>
+                  <a:schemeClr val="tx1"/>
+                </a:solidFill>
+                <a:latin typeface="+mn-lt"/>
+                <a:ea typeface="+mn-ea"/>
+                <a:cs typeface="+mn-cs"/>
+              </a:defRPr>
+            </a:lvl7pPr>
+            <a:lvl8pPr marL="3429000" indent="-228600" algn="l" defTabSz="914400" rtl="0" eaLnBrk="1" latinLnBrk="0" hangingPunct="1">
+              <a:lnSpc>
+                <a:spcPct val="90000"/>
+              </a:lnSpc>
+              <a:spcBef>
+                <a:spcPct val="30000"/>
+              </a:spcBef>
+              <a:buFont typeface="Arial" panose="020B0604020202020204" pitchFamily="34" charset="0"/>
+              <a:buChar char="•"/>
+              <a:defRPr sz="1800" kern="1200">
+                <a:solidFill>
+                  <a:schemeClr val="tx1"/>
+                </a:solidFill>
+                <a:latin typeface="+mn-lt"/>
+                <a:ea typeface="+mn-ea"/>
+                <a:cs typeface="+mn-cs"/>
+              </a:defRPr>
+            </a:lvl8pPr>
+            <a:lvl9pPr marL="3886200" indent="-228600" algn="l" defTabSz="914400" rtl="0" eaLnBrk="1" latinLnBrk="0" hangingPunct="1">
+              <a:lnSpc>
+                <a:spcPct val="90000"/>
+              </a:lnSpc>
+              <a:spcBef>
+                <a:spcPct val="30000"/>
+              </a:spcBef>
+              <a:buFont typeface="Arial" panose="020B0604020202020204" pitchFamily="34" charset="0"/>
+              <a:buChar char="•"/>
+              <a:defRPr sz="1800" kern="1200">
+                <a:solidFill>
+                  <a:schemeClr val="tx1"/>
+                </a:solidFill>
+                <a:latin typeface="+mn-lt"/>
+                <a:ea typeface="+mn-ea"/>
+                <a:cs typeface="+mn-cs"/>
+              </a:defRPr>
+            </a:lvl9pPr>
+          </a:lstStyle>
+          <a:p>
+            <a:pPr marL="0" lvl="0" indent="0">
+              <a:spcAft>
+                <a:spcPts val="600"/>
+              </a:spcAft>
+              <a:buNone/>
+              <a:defRPr/>
+            </a:pPr>
+            <a:r>
+              <a:rPr lang="ko-KR" altLang="en-US" dirty="0">
+                <a:latin typeface="Segoe UI" panose="020B0502040204020203" pitchFamily="34" charset="0"/>
+                <a:cs typeface="Segoe UI" panose="020B0502040204020203" pitchFamily="34" charset="0"/>
+              </a:rPr>
+              <a:t>푸는 방법</a:t>
+            </a:r>
+            <a:r>
+              <a:rPr lang="en-US" altLang="ko-KR" dirty="0">
+                <a:latin typeface="Segoe UI" panose="020B0502040204020203" pitchFamily="34" charset="0"/>
+                <a:cs typeface="Segoe UI" panose="020B0502040204020203" pitchFamily="34" charset="0"/>
+              </a:rPr>
+              <a:t>:</a:t>
+            </a:r>
+          </a:p>
+          <a:p>
+            <a:pPr marL="0" lvl="0" indent="0">
+              <a:spcAft>
+                <a:spcPts val="600"/>
+              </a:spcAft>
+              <a:buNone/>
+              <a:defRPr/>
+            </a:pPr>
+            <a:r>
+              <a:rPr lang="ko-KR" altLang="en-US" dirty="0">
+                <a:latin typeface="Segoe UI" panose="020B0502040204020203" pitchFamily="34" charset="0"/>
+                <a:cs typeface="Segoe UI" panose="020B0502040204020203" pitchFamily="34" charset="0"/>
+              </a:rPr>
+              <a:t>문제의 포인트는 모든 컴퓨터</a:t>
+            </a:r>
+            <a:r>
+              <a:rPr lang="en-US" altLang="ko-KR" dirty="0">
+                <a:latin typeface="Segoe UI" panose="020B0502040204020203" pitchFamily="34" charset="0"/>
+                <a:cs typeface="Segoe UI" panose="020B0502040204020203" pitchFamily="34" charset="0"/>
+              </a:rPr>
+              <a:t>(</a:t>
+            </a:r>
+            <a:r>
+              <a:rPr lang="ko-KR" altLang="en-US" dirty="0">
+                <a:latin typeface="Segoe UI" panose="020B0502040204020203" pitchFamily="34" charset="0"/>
+                <a:cs typeface="Segoe UI" panose="020B0502040204020203" pitchFamily="34" charset="0"/>
+              </a:rPr>
+              <a:t>점</a:t>
+            </a:r>
+            <a:r>
+              <a:rPr lang="en-US" altLang="ko-KR" dirty="0">
+                <a:latin typeface="Segoe UI" panose="020B0502040204020203" pitchFamily="34" charset="0"/>
+                <a:cs typeface="Segoe UI" panose="020B0502040204020203" pitchFamily="34" charset="0"/>
+              </a:rPr>
+              <a:t>)</a:t>
+            </a:r>
+            <a:r>
+              <a:rPr lang="ko-KR" altLang="en-US" dirty="0">
+                <a:latin typeface="Segoe UI" panose="020B0502040204020203" pitchFamily="34" charset="0"/>
+                <a:cs typeface="Segoe UI" panose="020B0502040204020203" pitchFamily="34" charset="0"/>
+              </a:rPr>
+              <a:t>을 연결한다</a:t>
+            </a:r>
+            <a:r>
+              <a:rPr lang="en-US" altLang="ko-KR" dirty="0">
+                <a:latin typeface="Segoe UI" panose="020B0502040204020203" pitchFamily="34" charset="0"/>
+                <a:cs typeface="Segoe UI" panose="020B0502040204020203" pitchFamily="34" charset="0"/>
+              </a:rPr>
+              <a:t>.</a:t>
+            </a:r>
+          </a:p>
+          <a:p>
+            <a:pPr marL="0" lvl="0" indent="0">
+              <a:spcAft>
+                <a:spcPts val="600"/>
+              </a:spcAft>
+              <a:buNone/>
+              <a:defRPr/>
+            </a:pPr>
+            <a:r>
+              <a:rPr lang="ko-KR" altLang="en-US" dirty="0">
+                <a:latin typeface="Segoe UI" panose="020B0502040204020203" pitchFamily="34" charset="0"/>
+                <a:cs typeface="Segoe UI" panose="020B0502040204020203" pitchFamily="34" charset="0"/>
+              </a:rPr>
+              <a:t>아</a:t>
+            </a:r>
+            <a:r>
+              <a:rPr lang="en-US" altLang="ko-KR" dirty="0">
+                <a:latin typeface="Segoe UI" panose="020B0502040204020203" pitchFamily="34" charset="0"/>
+                <a:cs typeface="Segoe UI" panose="020B0502040204020203" pitchFamily="34" charset="0"/>
+              </a:rPr>
+              <a:t>.! </a:t>
+            </a:r>
+            <a:r>
+              <a:rPr lang="ko-KR" altLang="en-US" dirty="0" err="1">
+                <a:latin typeface="Segoe UI" panose="020B0502040204020203" pitchFamily="34" charset="0"/>
+                <a:cs typeface="Segoe UI" panose="020B0502040204020203" pitchFamily="34" charset="0"/>
+              </a:rPr>
+              <a:t>최소스패닝</a:t>
+            </a:r>
+            <a:r>
+              <a:rPr lang="ko-KR" altLang="en-US" dirty="0">
+                <a:latin typeface="Segoe UI" panose="020B0502040204020203" pitchFamily="34" charset="0"/>
+                <a:cs typeface="Segoe UI" panose="020B0502040204020203" pitchFamily="34" charset="0"/>
+              </a:rPr>
+              <a:t> 트리</a:t>
+            </a:r>
+            <a:r>
+              <a:rPr lang="en-US" altLang="ko-KR" dirty="0">
+                <a:latin typeface="Segoe UI" panose="020B0502040204020203" pitchFamily="34" charset="0"/>
+                <a:cs typeface="Segoe UI" panose="020B0502040204020203" pitchFamily="34" charset="0"/>
+              </a:rPr>
+              <a:t>!</a:t>
+            </a:r>
+          </a:p>
+          <a:p>
+            <a:pPr marL="0" lvl="0" indent="0">
+              <a:spcAft>
+                <a:spcPts val="600"/>
+              </a:spcAft>
+              <a:buNone/>
+              <a:defRPr/>
+            </a:pPr>
+            <a:endParaRPr lang="en-US" altLang="ko-KR" dirty="0">
+              <a:latin typeface="Segoe UI" panose="020B0502040204020203" pitchFamily="34" charset="0"/>
+              <a:cs typeface="Segoe UI" panose="020B0502040204020203" pitchFamily="34" charset="0"/>
+            </a:endParaRPr>
+          </a:p>
+          <a:p>
+            <a:pPr marL="0" lvl="0" indent="0">
+              <a:spcAft>
+                <a:spcPts val="600"/>
+              </a:spcAft>
+              <a:buNone/>
+              <a:defRPr/>
+            </a:pPr>
+            <a:r>
+              <a:rPr lang="ko-KR" altLang="en-US" dirty="0" err="1">
+                <a:latin typeface="Segoe UI" panose="020B0502040204020203" pitchFamily="34" charset="0"/>
+                <a:cs typeface="Segoe UI" panose="020B0502040204020203" pitchFamily="34" charset="0"/>
+              </a:rPr>
+              <a:t>문제보니</a:t>
+            </a:r>
+            <a:r>
+              <a:rPr lang="ko-KR" altLang="en-US" dirty="0">
+                <a:latin typeface="Segoe UI" panose="020B0502040204020203" pitchFamily="34" charset="0"/>
+                <a:cs typeface="Segoe UI" panose="020B0502040204020203" pitchFamily="34" charset="0"/>
+              </a:rPr>
+              <a:t> 그대로 갖다 쓰면 되고</a:t>
+            </a:r>
+            <a:endParaRPr lang="en-US" altLang="ko-KR" dirty="0">
+              <a:latin typeface="Segoe UI" panose="020B0502040204020203" pitchFamily="34" charset="0"/>
+              <a:cs typeface="Segoe UI" panose="020B0502040204020203" pitchFamily="34" charset="0"/>
+            </a:endParaRPr>
+          </a:p>
+          <a:p>
+            <a:pPr marL="0" lvl="0" indent="0">
+              <a:spcAft>
+                <a:spcPts val="600"/>
+              </a:spcAft>
+              <a:buNone/>
+              <a:defRPr/>
+            </a:pPr>
+            <a:r>
+              <a:rPr lang="ko-KR" altLang="en-US" dirty="0">
+                <a:latin typeface="Segoe UI" panose="020B0502040204020203" pitchFamily="34" charset="0"/>
+                <a:cs typeface="Segoe UI" panose="020B0502040204020203" pitchFamily="34" charset="0"/>
+              </a:rPr>
+              <a:t>이제 고민 </a:t>
+            </a:r>
+            <a:r>
+              <a:rPr lang="ko-KR" altLang="en-US" dirty="0" err="1">
+                <a:latin typeface="Segoe UI" panose="020B0502040204020203" pitchFamily="34" charset="0"/>
+                <a:cs typeface="Segoe UI" panose="020B0502040204020203" pitchFamily="34" charset="0"/>
+              </a:rPr>
+              <a:t>해볼만한</a:t>
+            </a:r>
+            <a:r>
+              <a:rPr lang="ko-KR" altLang="en-US" dirty="0">
+                <a:latin typeface="Segoe UI" panose="020B0502040204020203" pitchFamily="34" charset="0"/>
+                <a:cs typeface="Segoe UI" panose="020B0502040204020203" pitchFamily="34" charset="0"/>
+              </a:rPr>
+              <a:t> 점은 </a:t>
+            </a:r>
+            <a:endParaRPr lang="en-US" altLang="ko-KR" dirty="0">
+              <a:latin typeface="Segoe UI" panose="020B0502040204020203" pitchFamily="34" charset="0"/>
+              <a:cs typeface="Segoe UI" panose="020B0502040204020203" pitchFamily="34" charset="0"/>
+            </a:endParaRPr>
+          </a:p>
+          <a:p>
+            <a:pPr marL="0" lvl="0" indent="0">
+              <a:spcAft>
+                <a:spcPts val="600"/>
+              </a:spcAft>
+              <a:buNone/>
+              <a:defRPr/>
+            </a:pPr>
+            <a:r>
+              <a:rPr lang="ko-KR" altLang="en-US" dirty="0" err="1">
+                <a:latin typeface="Segoe UI" panose="020B0502040204020203" pitchFamily="34" charset="0"/>
+                <a:cs typeface="Segoe UI" panose="020B0502040204020203" pitchFamily="34" charset="0"/>
+              </a:rPr>
+              <a:t>크루스칼이나</a:t>
+            </a:r>
+            <a:r>
+              <a:rPr lang="ko-KR" altLang="en-US" dirty="0">
+                <a:latin typeface="Segoe UI" panose="020B0502040204020203" pitchFamily="34" charset="0"/>
+                <a:cs typeface="Segoe UI" panose="020B0502040204020203" pitchFamily="34" charset="0"/>
+              </a:rPr>
+              <a:t> </a:t>
+            </a:r>
+            <a:r>
+              <a:rPr lang="ko-KR" altLang="en-US" dirty="0" err="1">
+                <a:latin typeface="Segoe UI" panose="020B0502040204020203" pitchFamily="34" charset="0"/>
+                <a:cs typeface="Segoe UI" panose="020B0502040204020203" pitchFamily="34" charset="0"/>
+              </a:rPr>
+              <a:t>프림이냐</a:t>
+            </a:r>
+            <a:r>
+              <a:rPr lang="ko-KR" altLang="en-US" dirty="0">
+                <a:latin typeface="Segoe UI" panose="020B0502040204020203" pitchFamily="34" charset="0"/>
+                <a:cs typeface="Segoe UI" panose="020B0502040204020203" pitchFamily="34" charset="0"/>
+              </a:rPr>
+              <a:t> </a:t>
+            </a:r>
+            <a:r>
+              <a:rPr lang="ko-KR" altLang="en-US" dirty="0" err="1">
+                <a:latin typeface="Segoe UI" panose="020B0502040204020203" pitchFamily="34" charset="0"/>
+                <a:cs typeface="Segoe UI" panose="020B0502040204020203" pitchFamily="34" charset="0"/>
+              </a:rPr>
+              <a:t>이건데</a:t>
+            </a:r>
+            <a:endParaRPr lang="en-US" altLang="ko-KR" dirty="0">
+              <a:latin typeface="Segoe UI" panose="020B0502040204020203" pitchFamily="34" charset="0"/>
+              <a:cs typeface="Segoe UI" panose="020B0502040204020203" pitchFamily="34" charset="0"/>
+            </a:endParaRPr>
+          </a:p>
+          <a:p>
+            <a:pPr marL="0" lvl="0" indent="0">
+              <a:spcAft>
+                <a:spcPts val="600"/>
+              </a:spcAft>
+              <a:buNone/>
+              <a:defRPr/>
+            </a:pPr>
+            <a:r>
+              <a:rPr lang="en-US" altLang="ko-KR" dirty="0" err="1">
+                <a:latin typeface="Segoe UI" panose="020B0502040204020203" pitchFamily="34" charset="0"/>
+                <a:cs typeface="Segoe UI" panose="020B0502040204020203" pitchFamily="34" charset="0"/>
+              </a:rPr>
+              <a:t>ElogE</a:t>
+            </a:r>
+            <a:r>
+              <a:rPr lang="ko-KR" altLang="en-US" dirty="0">
+                <a:latin typeface="Segoe UI" panose="020B0502040204020203" pitchFamily="34" charset="0"/>
+                <a:cs typeface="Segoe UI" panose="020B0502040204020203" pitchFamily="34" charset="0"/>
+              </a:rPr>
+              <a:t>냐 </a:t>
+            </a:r>
+            <a:r>
+              <a:rPr lang="en-US" altLang="ko-KR" dirty="0">
+                <a:latin typeface="Segoe UI" panose="020B0502040204020203" pitchFamily="34" charset="0"/>
+                <a:cs typeface="Segoe UI" panose="020B0502040204020203" pitchFamily="34" charset="0"/>
+              </a:rPr>
+              <a:t>V^2</a:t>
+            </a:r>
+            <a:r>
+              <a:rPr lang="ko-KR" altLang="en-US" dirty="0">
+                <a:latin typeface="Segoe UI" panose="020B0502040204020203" pitchFamily="34" charset="0"/>
+                <a:cs typeface="Segoe UI" panose="020B0502040204020203" pitchFamily="34" charset="0"/>
+              </a:rPr>
+              <a:t>이냐</a:t>
+            </a:r>
+            <a:r>
+              <a:rPr lang="en-US" altLang="ko-KR" dirty="0">
+                <a:latin typeface="Segoe UI" panose="020B0502040204020203" pitchFamily="34" charset="0"/>
+                <a:cs typeface="Segoe UI" panose="020B0502040204020203" pitchFamily="34" charset="0"/>
+              </a:rPr>
+              <a:t>.</a:t>
+            </a:r>
+          </a:p>
+          <a:p>
+            <a:pPr marL="0" lvl="0" indent="0">
+              <a:spcAft>
+                <a:spcPts val="600"/>
+              </a:spcAft>
+              <a:buNone/>
+              <a:defRPr/>
+            </a:pPr>
+            <a:r>
+              <a:rPr lang="ko-KR" altLang="en-US" dirty="0">
+                <a:latin typeface="Segoe UI" panose="020B0502040204020203" pitchFamily="34" charset="0"/>
+                <a:cs typeface="Segoe UI" panose="020B0502040204020203" pitchFamily="34" charset="0"/>
+              </a:rPr>
+              <a:t>문제를 보면 </a:t>
+            </a:r>
+            <a:r>
+              <a:rPr lang="ko-KR" altLang="en-US" dirty="0" err="1">
+                <a:latin typeface="Segoe UI" panose="020B0502040204020203" pitchFamily="34" charset="0"/>
+                <a:cs typeface="Segoe UI" panose="020B0502040204020203" pitchFamily="34" charset="0"/>
+              </a:rPr>
+              <a:t>둘다</a:t>
+            </a:r>
+            <a:r>
+              <a:rPr lang="ko-KR" altLang="en-US" dirty="0">
+                <a:latin typeface="Segoe UI" panose="020B0502040204020203" pitchFamily="34" charset="0"/>
+                <a:cs typeface="Segoe UI" panose="020B0502040204020203" pitchFamily="34" charset="0"/>
+              </a:rPr>
+              <a:t> 상관없겠구나 </a:t>
+            </a:r>
+            <a:r>
+              <a:rPr lang="ko-KR" altLang="en-US" dirty="0" err="1">
+                <a:latin typeface="Segoe UI" panose="020B0502040204020203" pitchFamily="34" charset="0"/>
+                <a:cs typeface="Segoe UI" panose="020B0502040204020203" pitchFamily="34" charset="0"/>
+              </a:rPr>
+              <a:t>알수</a:t>
+            </a:r>
+            <a:r>
+              <a:rPr lang="ko-KR" altLang="en-US" dirty="0">
+                <a:latin typeface="Segoe UI" panose="020B0502040204020203" pitchFamily="34" charset="0"/>
+                <a:cs typeface="Segoe UI" panose="020B0502040204020203" pitchFamily="34" charset="0"/>
+              </a:rPr>
+              <a:t> 있다</a:t>
+            </a:r>
+            <a:r>
+              <a:rPr lang="en-US" altLang="ko-KR" dirty="0">
+                <a:latin typeface="Segoe UI" panose="020B0502040204020203" pitchFamily="34" charset="0"/>
+                <a:cs typeface="Segoe UI" panose="020B0502040204020203" pitchFamily="34" charset="0"/>
+              </a:rPr>
+              <a:t>.</a:t>
+            </a:r>
+          </a:p>
+          <a:p>
+            <a:pPr marL="0" lvl="0" indent="0">
+              <a:spcAft>
+                <a:spcPts val="600"/>
+              </a:spcAft>
+              <a:buNone/>
+              <a:defRPr/>
+            </a:pPr>
+            <a:endParaRPr lang="en-US" dirty="0">
+              <a:latin typeface="Segoe UI" panose="020B0502040204020203" pitchFamily="34" charset="0"/>
+              <a:cs typeface="Segoe UI" panose="020B0502040204020203" pitchFamily="34" charset="0"/>
+            </a:endParaRPr>
+          </a:p>
+        </p:txBody>
+      </p:sp>
+      <p:sp>
+        <p:nvSpPr>
+          <p:cNvPr id="6" name="Content Placeholder 17">
+            <a:extLst>
+              <a:ext uri="{FF2B5EF4-FFF2-40B4-BE49-F238E27FC236}">
+                <a16:creationId xmlns:a16="http://schemas.microsoft.com/office/drawing/2014/main" id="{5E182D09-4B38-48ED-8ED1-2194E84D6BD5}"/>
+              </a:ext>
+            </a:extLst>
+          </p:cNvPr>
+          <p:cNvSpPr txBox="1">
+            <a:spLocks/>
+          </p:cNvSpPr>
+          <p:nvPr/>
+        </p:nvSpPr>
+        <p:spPr>
+          <a:xfrm>
+            <a:off x="5237474" y="1687741"/>
+            <a:ext cx="4321704" cy="3871518"/>
+          </a:xfrm>
+          <a:prstGeom prst="rect">
+            <a:avLst/>
+          </a:prstGeom>
+        </p:spPr>
+        <p:txBody>
+          <a:bodyPr vert="horz" lIns="91440" tIns="45720" rIns="91440" bIns="45720" rtlCol="0">
+            <a:normAutofit/>
+          </a:bodyPr>
+          <a:lstStyle>
+            <a:lvl1pPr marL="228600" indent="-228600" algn="l" defTabSz="914400" rtl="0" eaLnBrk="1" latinLnBrk="0" hangingPunct="1">
+              <a:lnSpc>
+                <a:spcPts val="1800"/>
+              </a:lnSpc>
+              <a:spcBef>
+                <a:spcPts val="1000"/>
+              </a:spcBef>
+              <a:spcAft>
+                <a:spcPts val="1000"/>
+              </a:spcAft>
+              <a:buFont typeface="Arial" panose="020B0604020202020204" pitchFamily="34" charset="0"/>
+              <a:buChar char="•"/>
+              <a:defRPr lang="en-US" sz="1200" kern="1200" smtClean="0">
+                <a:solidFill>
+                  <a:schemeClr val="tx1">
+                    <a:lumMod val="75000"/>
+                    <a:lumOff val="25000"/>
+                  </a:schemeClr>
+                </a:solidFill>
+                <a:latin typeface="+mn-lt"/>
+                <a:ea typeface="+mn-ea"/>
+                <a:cs typeface="+mn-cs"/>
+              </a:defRPr>
+            </a:lvl1pPr>
+            <a:lvl2pPr marL="685800" indent="-228600" algn="l" defTabSz="914400" rtl="0" eaLnBrk="1" latinLnBrk="0" hangingPunct="1">
+              <a:lnSpc>
+                <a:spcPts val="1800"/>
+              </a:lnSpc>
+              <a:spcBef>
+                <a:spcPts val="1000"/>
+              </a:spcBef>
+              <a:spcAft>
+                <a:spcPts val="1000"/>
+              </a:spcAft>
+              <a:buFont typeface="Arial" panose="020B0604020202020204" pitchFamily="34" charset="0"/>
+              <a:buChar char="•"/>
+              <a:defRPr lang="en-US" sz="1200" kern="1200" smtClean="0">
+                <a:solidFill>
+                  <a:schemeClr val="tx1">
+                    <a:lumMod val="75000"/>
+                    <a:lumOff val="25000"/>
+                  </a:schemeClr>
+                </a:solidFill>
+                <a:latin typeface="+mn-lt"/>
+                <a:ea typeface="+mn-ea"/>
+                <a:cs typeface="+mn-cs"/>
+              </a:defRPr>
+            </a:lvl2pPr>
+            <a:lvl3pPr marL="1143000" indent="-228600" algn="l" defTabSz="914400" rtl="0" eaLnBrk="1" latinLnBrk="0" hangingPunct="1">
+              <a:lnSpc>
+                <a:spcPts val="1800"/>
+              </a:lnSpc>
+              <a:spcBef>
+                <a:spcPts val="1000"/>
+              </a:spcBef>
+              <a:spcAft>
+                <a:spcPts val="1000"/>
+              </a:spcAft>
+              <a:buFont typeface="Arial" panose="020B0604020202020204" pitchFamily="34" charset="0"/>
+              <a:buChar char="•"/>
+              <a:defRPr lang="en-US" sz="1200" kern="1200" smtClean="0">
+                <a:solidFill>
+                  <a:schemeClr val="tx1">
+                    <a:lumMod val="75000"/>
+                    <a:lumOff val="25000"/>
+                  </a:schemeClr>
+                </a:solidFill>
+                <a:latin typeface="+mn-lt"/>
+                <a:ea typeface="+mn-ea"/>
+                <a:cs typeface="+mn-cs"/>
+              </a:defRPr>
+            </a:lvl3pPr>
+            <a:lvl4pPr marL="1600200" indent="-228600" algn="l" defTabSz="914400" rtl="0" eaLnBrk="1" latinLnBrk="0" hangingPunct="1">
+              <a:lnSpc>
+                <a:spcPts val="1800"/>
+              </a:lnSpc>
+              <a:spcBef>
+                <a:spcPts val="1000"/>
+              </a:spcBef>
+              <a:spcAft>
+                <a:spcPts val="1000"/>
+              </a:spcAft>
+              <a:buFont typeface="Arial" panose="020B0604020202020204" pitchFamily="34" charset="0"/>
+              <a:buChar char="•"/>
+              <a:defRPr lang="en-US" sz="1200" kern="1200" smtClean="0">
+                <a:solidFill>
+                  <a:schemeClr val="tx1">
+                    <a:lumMod val="75000"/>
+                    <a:lumOff val="25000"/>
+                  </a:schemeClr>
+                </a:solidFill>
+                <a:latin typeface="+mn-lt"/>
+                <a:ea typeface="+mn-ea"/>
+                <a:cs typeface="+mn-cs"/>
+              </a:defRPr>
+            </a:lvl4pPr>
+            <a:lvl5pPr marL="2057400" indent="-228600" algn="l" defTabSz="914400" rtl="0" eaLnBrk="1" latinLnBrk="0" hangingPunct="1">
+              <a:lnSpc>
+                <a:spcPts val="1800"/>
+              </a:lnSpc>
+              <a:spcBef>
+                <a:spcPts val="1000"/>
+              </a:spcBef>
+              <a:spcAft>
+                <a:spcPts val="1000"/>
+              </a:spcAft>
+              <a:buFont typeface="Arial" panose="020B0604020202020204" pitchFamily="34" charset="0"/>
+              <a:buChar char="•"/>
+              <a:defRPr lang="en-US" sz="1200" kern="1200">
+                <a:solidFill>
+                  <a:schemeClr val="tx1">
+                    <a:lumMod val="75000"/>
+                    <a:lumOff val="25000"/>
+                  </a:schemeClr>
+                </a:solidFill>
+                <a:latin typeface="+mn-lt"/>
+                <a:ea typeface="+mn-ea"/>
+                <a:cs typeface="+mn-cs"/>
+              </a:defRPr>
+            </a:lvl5pPr>
+            <a:lvl6pPr marL="2514600" indent="-228600" algn="l" defTabSz="914400" rtl="0" eaLnBrk="1" latinLnBrk="0" hangingPunct="1">
+              <a:lnSpc>
+                <a:spcPct val="90000"/>
+              </a:lnSpc>
+              <a:spcBef>
+                <a:spcPct val="30000"/>
+              </a:spcBef>
+              <a:buFont typeface="Arial" panose="020B0604020202020204" pitchFamily="34" charset="0"/>
+              <a:buChar char="•"/>
+              <a:defRPr sz="1800" kern="1200">
+                <a:solidFill>
+                  <a:schemeClr val="tx1"/>
+                </a:solidFill>
+                <a:latin typeface="+mn-lt"/>
+                <a:ea typeface="+mn-ea"/>
+                <a:cs typeface="+mn-cs"/>
+              </a:defRPr>
+            </a:lvl6pPr>
+            <a:lvl7pPr marL="2971800" indent="-228600" algn="l" defTabSz="914400" rtl="0" eaLnBrk="1" latinLnBrk="0" hangingPunct="1">
+              <a:lnSpc>
+                <a:spcPct val="90000"/>
+              </a:lnSpc>
+              <a:spcBef>
+                <a:spcPct val="30000"/>
+              </a:spcBef>
+              <a:buFont typeface="Arial" panose="020B0604020202020204" pitchFamily="34" charset="0"/>
+              <a:buChar char="•"/>
+              <a:defRPr sz="1800" kern="1200">
+                <a:solidFill>
+                  <a:schemeClr val="tx1"/>
+                </a:solidFill>
+                <a:latin typeface="+mn-lt"/>
+                <a:ea typeface="+mn-ea"/>
+                <a:cs typeface="+mn-cs"/>
+              </a:defRPr>
+            </a:lvl7pPr>
+            <a:lvl8pPr marL="3429000" indent="-228600" algn="l" defTabSz="914400" rtl="0" eaLnBrk="1" latinLnBrk="0" hangingPunct="1">
+              <a:lnSpc>
+                <a:spcPct val="90000"/>
+              </a:lnSpc>
+              <a:spcBef>
+                <a:spcPct val="30000"/>
+              </a:spcBef>
+              <a:buFont typeface="Arial" panose="020B0604020202020204" pitchFamily="34" charset="0"/>
+              <a:buChar char="•"/>
+              <a:defRPr sz="1800" kern="1200">
+                <a:solidFill>
+                  <a:schemeClr val="tx1"/>
+                </a:solidFill>
+                <a:latin typeface="+mn-lt"/>
+                <a:ea typeface="+mn-ea"/>
+                <a:cs typeface="+mn-cs"/>
+              </a:defRPr>
+            </a:lvl8pPr>
+            <a:lvl9pPr marL="3886200" indent="-228600" algn="l" defTabSz="914400" rtl="0" eaLnBrk="1" latinLnBrk="0" hangingPunct="1">
+              <a:lnSpc>
+                <a:spcPct val="90000"/>
+              </a:lnSpc>
+              <a:spcBef>
+                <a:spcPct val="30000"/>
+              </a:spcBef>
+              <a:buFont typeface="Arial" panose="020B0604020202020204" pitchFamily="34" charset="0"/>
+              <a:buChar char="•"/>
+              <a:defRPr sz="1800" kern="1200">
+                <a:solidFill>
+                  <a:schemeClr val="tx1"/>
+                </a:solidFill>
+                <a:latin typeface="+mn-lt"/>
+                <a:ea typeface="+mn-ea"/>
+                <a:cs typeface="+mn-cs"/>
+              </a:defRPr>
+            </a:lvl9pPr>
+          </a:lstStyle>
+          <a:p>
+            <a:pPr marL="0" lvl="0" indent="0">
+              <a:spcAft>
+                <a:spcPts val="600"/>
+              </a:spcAft>
+              <a:buNone/>
+              <a:defRPr/>
+            </a:pPr>
+            <a:r>
+              <a:rPr lang="ko-KR" altLang="en-US" dirty="0" err="1">
+                <a:latin typeface="Segoe UI" panose="020B0502040204020203" pitchFamily="34" charset="0"/>
+                <a:cs typeface="Segoe UI" panose="020B0502040204020203" pitchFamily="34" charset="0"/>
+              </a:rPr>
+              <a:t>깨달은점</a:t>
+            </a:r>
+            <a:endParaRPr lang="en-US" altLang="ko-KR" dirty="0">
+              <a:latin typeface="Segoe UI" panose="020B0502040204020203" pitchFamily="34" charset="0"/>
+              <a:cs typeface="Segoe UI" panose="020B0502040204020203" pitchFamily="34" charset="0"/>
+            </a:endParaRPr>
+          </a:p>
+          <a:p>
+            <a:pPr marL="0" lvl="0" indent="0">
+              <a:spcAft>
+                <a:spcPts val="600"/>
+              </a:spcAft>
+              <a:buNone/>
+              <a:defRPr/>
+            </a:pPr>
+            <a:endParaRPr lang="en-US" altLang="ko-KR" dirty="0">
+              <a:latin typeface="Segoe UI" panose="020B0502040204020203" pitchFamily="34" charset="0"/>
+              <a:cs typeface="Segoe UI" panose="020B0502040204020203" pitchFamily="34" charset="0"/>
+            </a:endParaRPr>
+          </a:p>
+          <a:p>
+            <a:pPr marL="0" lvl="0" indent="0">
+              <a:spcAft>
+                <a:spcPts val="600"/>
+              </a:spcAft>
+              <a:buNone/>
+              <a:defRPr/>
+            </a:pPr>
+            <a:r>
+              <a:rPr lang="en-US" altLang="ko-KR" dirty="0">
+                <a:latin typeface="Segoe UI" panose="020B0502040204020203" pitchFamily="34" charset="0"/>
+                <a:cs typeface="Segoe UI" panose="020B0502040204020203" pitchFamily="34" charset="0"/>
+              </a:rPr>
+              <a:t>: </a:t>
+            </a:r>
+            <a:r>
+              <a:rPr lang="ko-KR" altLang="en-US" dirty="0">
+                <a:latin typeface="Segoe UI" panose="020B0502040204020203" pitchFamily="34" charset="0"/>
+                <a:cs typeface="Segoe UI" panose="020B0502040204020203" pitchFamily="34" charset="0"/>
+              </a:rPr>
+              <a:t>역시 아는 만큼 보이는 법</a:t>
+            </a:r>
+            <a:r>
+              <a:rPr lang="en-US" altLang="ko-KR" dirty="0">
+                <a:latin typeface="Segoe UI" panose="020B0502040204020203" pitchFamily="34" charset="0"/>
+                <a:cs typeface="Segoe UI" panose="020B0502040204020203" pitchFamily="34" charset="0"/>
+              </a:rPr>
+              <a:t>.</a:t>
+            </a:r>
+          </a:p>
+        </p:txBody>
+      </p:sp>
+    </p:spTree>
+    <p:extLst>
+      <p:ext uri="{BB962C8B-B14F-4D97-AF65-F5344CB8AC3E}">
+        <p14:creationId xmlns:p14="http://schemas.microsoft.com/office/powerpoint/2010/main" val="637490514"/>
+      </p:ext>
+    </p:extLst>
+  </p:cSld>
+  <p:clrMapOvr>
+    <a:masterClrMapping/>
+  </p:clrMapOvr>
+  <mc:AlternateContent xmlns:mc="http://schemas.openxmlformats.org/markup-compatibility/2006" xmlns:p14="http://schemas.microsoft.com/office/powerpoint/2010/main">
+    <mc:Choice Requires="p14">
+      <p:transition p14:dur="10"/>
+    </mc:Choice>
+    <mc:Fallback xmlns="">
+      <p:transition/>
+    </mc:Fallback>
+  </mc:AlternateContent>
+</p:sld>
+</file>
+
+<file path=ppt/slides/slide5.xml><?xml version="1.0" encoding="utf-8"?>
 <p:sld xmlns:a="http://schemas.openxmlformats.org/drawingml/2006/main" xmlns:r="http://schemas.openxmlformats.org/officeDocument/2006/relationships" xmlns:p="http://schemas.openxmlformats.org/presentationml/2006/main">
   <p:cSld>
     <p:spTree>
@@ -6902,7 +9319,7 @@
 </p:sld>
 </file>
 
-<file path=ppt/slides/slide5.xml><?xml version="1.0" encoding="utf-8"?>
+<file path=ppt/slides/slide6.xml><?xml version="1.0" encoding="utf-8"?>
 <p:sld xmlns:a="http://schemas.openxmlformats.org/drawingml/2006/main" xmlns:r="http://schemas.openxmlformats.org/officeDocument/2006/relationships" xmlns:p="http://schemas.openxmlformats.org/presentationml/2006/main">
   <p:cSld>
     <p:spTree>
@@ -7229,7 +9646,7 @@
 </p:sld>
 </file>
 
-<file path=ppt/slides/slide6.xml><?xml version="1.0" encoding="utf-8"?>
+<file path=ppt/slides/slide7.xml><?xml version="1.0" encoding="utf-8"?>
 <p:sld xmlns:a="http://schemas.openxmlformats.org/drawingml/2006/main" xmlns:r="http://schemas.openxmlformats.org/officeDocument/2006/relationships" xmlns:p="http://schemas.openxmlformats.org/presentationml/2006/main">
   <p:cSld>
     <p:spTree>
@@ -9256,7 +11673,7 @@
 </p:sld>
 </file>
 
-<file path=ppt/slides/slide7.xml><?xml version="1.0" encoding="utf-8"?>
+<file path=ppt/slides/slide8.xml><?xml version="1.0" encoding="utf-8"?>
 <p:sld xmlns:a="http://schemas.openxmlformats.org/drawingml/2006/main" xmlns:r="http://schemas.openxmlformats.org/officeDocument/2006/relationships" xmlns:p="http://schemas.openxmlformats.org/presentationml/2006/main">
   <p:cSld>
     <p:spTree>
@@ -10550,7 +12967,7 @@
 </p:sld>
 </file>
 
-<file path=ppt/slides/slide8.xml><?xml version="1.0" encoding="utf-8"?>
+<file path=ppt/slides/slide9.xml><?xml version="1.0" encoding="utf-8"?>
 <p:sld xmlns:a="http://schemas.openxmlformats.org/drawingml/2006/main" xmlns:r="http://schemas.openxmlformats.org/officeDocument/2006/relationships" xmlns:p="http://schemas.openxmlformats.org/presentationml/2006/main">
   <p:cSld>
     <p:spTree>
@@ -12238,1482 +14655,6 @@
     <p:extLst>
       <p:ext uri="{BB962C8B-B14F-4D97-AF65-F5344CB8AC3E}">
         <p14:creationId xmlns:p14="http://schemas.microsoft.com/office/powerpoint/2010/main" val="727668169"/>
-      </p:ext>
-    </p:extLst>
-  </p:cSld>
-  <p:clrMapOvr>
-    <a:masterClrMapping/>
-  </p:clrMapOvr>
-  <mc:AlternateContent xmlns:mc="http://schemas.openxmlformats.org/markup-compatibility/2006" xmlns:p14="http://schemas.microsoft.com/office/powerpoint/2010/main">
-    <mc:Choice Requires="p14">
-      <p:transition p14:dur="10"/>
-    </mc:Choice>
-    <mc:Fallback xmlns="">
-      <p:transition/>
-    </mc:Fallback>
-  </mc:AlternateContent>
-</p:sld>
-</file>
-
-<file path=ppt/slides/slide9.xml><?xml version="1.0" encoding="utf-8"?>
-<p:sld xmlns:a="http://schemas.openxmlformats.org/drawingml/2006/main" xmlns:r="http://schemas.openxmlformats.org/officeDocument/2006/relationships" xmlns:p="http://schemas.openxmlformats.org/presentationml/2006/main">
-  <p:cSld>
-    <p:spTree>
-      <p:nvGrpSpPr>
-        <p:cNvPr id="1" name=""/>
-        <p:cNvGrpSpPr/>
-        <p:nvPr/>
-      </p:nvGrpSpPr>
-      <p:grpSpPr>
-        <a:xfrm>
-          <a:off x="0" y="0"/>
-          <a:ext cx="0" cy="0"/>
-          <a:chOff x="0" y="0"/>
-          <a:chExt cx="0" cy="0"/>
-        </a:xfrm>
-      </p:grpSpPr>
-      <p:sp>
-        <p:nvSpPr>
-          <p:cNvPr id="8" name="Title 7"/>
-          <p:cNvSpPr>
-            <a:spLocks noGrp="1"/>
-          </p:cNvSpPr>
-          <p:nvPr>
-            <p:ph type="title"/>
-          </p:nvPr>
-        </p:nvSpPr>
-        <p:spPr/>
-        <p:txBody>
-          <a:bodyPr/>
-          <a:lstStyle/>
-          <a:p>
-            <a:r>
-              <a:rPr lang="en-US" dirty="0">
-                <a:latin typeface="Segoe UI Light" panose="020B0502040204020203" pitchFamily="34" charset="0"/>
-                <a:cs typeface="Segoe UI Light" panose="020B0502040204020203" pitchFamily="34" charset="0"/>
-              </a:rPr>
-              <a:t>Explore without leaving your slides</a:t>
-            </a:r>
-          </a:p>
-        </p:txBody>
-      </p:sp>
-      <p:sp>
-        <p:nvSpPr>
-          <p:cNvPr id="16" name="Content Placeholder 17"/>
-          <p:cNvSpPr txBox="1">
-            <a:spLocks/>
-          </p:cNvSpPr>
-          <p:nvPr/>
-        </p:nvSpPr>
-        <p:spPr>
-          <a:xfrm>
-            <a:off x="541609" y="1296100"/>
-            <a:ext cx="6093106" cy="1236475"/>
-          </a:xfrm>
-          <a:prstGeom prst="rect">
-            <a:avLst/>
-          </a:prstGeom>
-        </p:spPr>
-        <p:txBody>
-          <a:bodyPr vert="horz" lIns="91440" tIns="45720" rIns="91440" bIns="45720" rtlCol="0">
-            <a:normAutofit/>
-          </a:bodyPr>
-          <a:lstStyle>
-            <a:lvl1pPr marL="228600" indent="-228600" algn="l" defTabSz="914400" rtl="0" eaLnBrk="1" latinLnBrk="0" hangingPunct="1">
-              <a:lnSpc>
-                <a:spcPts val="1800"/>
-              </a:lnSpc>
-              <a:spcBef>
-                <a:spcPts val="1000"/>
-              </a:spcBef>
-              <a:spcAft>
-                <a:spcPts val="1000"/>
-              </a:spcAft>
-              <a:buFont typeface="Arial" panose="020B0604020202020204" pitchFamily="34" charset="0"/>
-              <a:buChar char="•"/>
-              <a:defRPr lang="en-US" sz="1200" kern="1200" smtClean="0">
-                <a:solidFill>
-                  <a:schemeClr val="tx1">
-                    <a:lumMod val="75000"/>
-                    <a:lumOff val="25000"/>
-                  </a:schemeClr>
-                </a:solidFill>
-                <a:latin typeface="+mn-lt"/>
-                <a:ea typeface="+mn-ea"/>
-                <a:cs typeface="+mn-cs"/>
-              </a:defRPr>
-            </a:lvl1pPr>
-            <a:lvl2pPr marL="685800" indent="-228600" algn="l" defTabSz="914400" rtl="0" eaLnBrk="1" latinLnBrk="0" hangingPunct="1">
-              <a:lnSpc>
-                <a:spcPts val="1800"/>
-              </a:lnSpc>
-              <a:spcBef>
-                <a:spcPts val="1000"/>
-              </a:spcBef>
-              <a:spcAft>
-                <a:spcPts val="1000"/>
-              </a:spcAft>
-              <a:buFont typeface="Arial" panose="020B0604020202020204" pitchFamily="34" charset="0"/>
-              <a:buChar char="•"/>
-              <a:defRPr lang="en-US" sz="1200" kern="1200" smtClean="0">
-                <a:solidFill>
-                  <a:schemeClr val="tx1">
-                    <a:lumMod val="75000"/>
-                    <a:lumOff val="25000"/>
-                  </a:schemeClr>
-                </a:solidFill>
-                <a:latin typeface="+mn-lt"/>
-                <a:ea typeface="+mn-ea"/>
-                <a:cs typeface="+mn-cs"/>
-              </a:defRPr>
-            </a:lvl2pPr>
-            <a:lvl3pPr marL="1143000" indent="-228600" algn="l" defTabSz="914400" rtl="0" eaLnBrk="1" latinLnBrk="0" hangingPunct="1">
-              <a:lnSpc>
-                <a:spcPts val="1800"/>
-              </a:lnSpc>
-              <a:spcBef>
-                <a:spcPts val="1000"/>
-              </a:spcBef>
-              <a:spcAft>
-                <a:spcPts val="1000"/>
-              </a:spcAft>
-              <a:buFont typeface="Arial" panose="020B0604020202020204" pitchFamily="34" charset="0"/>
-              <a:buChar char="•"/>
-              <a:defRPr lang="en-US" sz="1200" kern="1200" smtClean="0">
-                <a:solidFill>
-                  <a:schemeClr val="tx1">
-                    <a:lumMod val="75000"/>
-                    <a:lumOff val="25000"/>
-                  </a:schemeClr>
-                </a:solidFill>
-                <a:latin typeface="+mn-lt"/>
-                <a:ea typeface="+mn-ea"/>
-                <a:cs typeface="+mn-cs"/>
-              </a:defRPr>
-            </a:lvl3pPr>
-            <a:lvl4pPr marL="1600200" indent="-228600" algn="l" defTabSz="914400" rtl="0" eaLnBrk="1" latinLnBrk="0" hangingPunct="1">
-              <a:lnSpc>
-                <a:spcPts val="1800"/>
-              </a:lnSpc>
-              <a:spcBef>
-                <a:spcPts val="1000"/>
-              </a:spcBef>
-              <a:spcAft>
-                <a:spcPts val="1000"/>
-              </a:spcAft>
-              <a:buFont typeface="Arial" panose="020B0604020202020204" pitchFamily="34" charset="0"/>
-              <a:buChar char="•"/>
-              <a:defRPr lang="en-US" sz="1200" kern="1200" smtClean="0">
-                <a:solidFill>
-                  <a:schemeClr val="tx1">
-                    <a:lumMod val="75000"/>
-                    <a:lumOff val="25000"/>
-                  </a:schemeClr>
-                </a:solidFill>
-                <a:latin typeface="+mn-lt"/>
-                <a:ea typeface="+mn-ea"/>
-                <a:cs typeface="+mn-cs"/>
-              </a:defRPr>
-            </a:lvl4pPr>
-            <a:lvl5pPr marL="2057400" indent="-228600" algn="l" defTabSz="914400" rtl="0" eaLnBrk="1" latinLnBrk="0" hangingPunct="1">
-              <a:lnSpc>
-                <a:spcPts val="1800"/>
-              </a:lnSpc>
-              <a:spcBef>
-                <a:spcPts val="1000"/>
-              </a:spcBef>
-              <a:spcAft>
-                <a:spcPts val="1000"/>
-              </a:spcAft>
-              <a:buFont typeface="Arial" panose="020B0604020202020204" pitchFamily="34" charset="0"/>
-              <a:buChar char="•"/>
-              <a:defRPr lang="en-US" sz="1200" kern="1200">
-                <a:solidFill>
-                  <a:schemeClr val="tx1">
-                    <a:lumMod val="75000"/>
-                    <a:lumOff val="25000"/>
-                  </a:schemeClr>
-                </a:solidFill>
-                <a:latin typeface="+mn-lt"/>
-                <a:ea typeface="+mn-ea"/>
-                <a:cs typeface="+mn-cs"/>
-              </a:defRPr>
-            </a:lvl5pPr>
-            <a:lvl6pPr marL="2514600" indent="-228600" algn="l" defTabSz="914400" rtl="0" eaLnBrk="1" latinLnBrk="0" hangingPunct="1">
-              <a:lnSpc>
-                <a:spcPct val="90000"/>
-              </a:lnSpc>
-              <a:spcBef>
-                <a:spcPct val="30000"/>
-              </a:spcBef>
-              <a:buFont typeface="Arial" panose="020B0604020202020204" pitchFamily="34" charset="0"/>
-              <a:buChar char="•"/>
-              <a:defRPr sz="1800" kern="1200">
-                <a:solidFill>
-                  <a:schemeClr val="tx1"/>
-                </a:solidFill>
-                <a:latin typeface="+mn-lt"/>
-                <a:ea typeface="+mn-ea"/>
-                <a:cs typeface="+mn-cs"/>
-              </a:defRPr>
-            </a:lvl6pPr>
-            <a:lvl7pPr marL="2971800" indent="-228600" algn="l" defTabSz="914400" rtl="0" eaLnBrk="1" latinLnBrk="0" hangingPunct="1">
-              <a:lnSpc>
-                <a:spcPct val="90000"/>
-              </a:lnSpc>
-              <a:spcBef>
-                <a:spcPct val="30000"/>
-              </a:spcBef>
-              <a:buFont typeface="Arial" panose="020B0604020202020204" pitchFamily="34" charset="0"/>
-              <a:buChar char="•"/>
-              <a:defRPr sz="1800" kern="1200">
-                <a:solidFill>
-                  <a:schemeClr val="tx1"/>
-                </a:solidFill>
-                <a:latin typeface="+mn-lt"/>
-                <a:ea typeface="+mn-ea"/>
-                <a:cs typeface="+mn-cs"/>
-              </a:defRPr>
-            </a:lvl7pPr>
-            <a:lvl8pPr marL="3429000" indent="-228600" algn="l" defTabSz="914400" rtl="0" eaLnBrk="1" latinLnBrk="0" hangingPunct="1">
-              <a:lnSpc>
-                <a:spcPct val="90000"/>
-              </a:lnSpc>
-              <a:spcBef>
-                <a:spcPct val="30000"/>
-              </a:spcBef>
-              <a:buFont typeface="Arial" panose="020B0604020202020204" pitchFamily="34" charset="0"/>
-              <a:buChar char="•"/>
-              <a:defRPr sz="1800" kern="1200">
-                <a:solidFill>
-                  <a:schemeClr val="tx1"/>
-                </a:solidFill>
-                <a:latin typeface="+mn-lt"/>
-                <a:ea typeface="+mn-ea"/>
-                <a:cs typeface="+mn-cs"/>
-              </a:defRPr>
-            </a:lvl8pPr>
-            <a:lvl9pPr marL="3886200" indent="-228600" algn="l" defTabSz="914400" rtl="0" eaLnBrk="1" latinLnBrk="0" hangingPunct="1">
-              <a:lnSpc>
-                <a:spcPct val="90000"/>
-              </a:lnSpc>
-              <a:spcBef>
-                <a:spcPct val="30000"/>
-              </a:spcBef>
-              <a:buFont typeface="Arial" panose="020B0604020202020204" pitchFamily="34" charset="0"/>
-              <a:buChar char="•"/>
-              <a:defRPr sz="1800" kern="1200">
-                <a:solidFill>
-                  <a:schemeClr val="tx1"/>
-                </a:solidFill>
-                <a:latin typeface="+mn-lt"/>
-                <a:ea typeface="+mn-ea"/>
-                <a:cs typeface="+mn-cs"/>
-              </a:defRPr>
-            </a:lvl9pPr>
-          </a:lstStyle>
-          <a:p>
-            <a:pPr marL="0" indent="0">
-              <a:spcAft>
-                <a:spcPts val="2000"/>
-              </a:spcAft>
-              <a:buNone/>
-            </a:pPr>
-            <a:r>
-              <a:rPr lang="en-US" dirty="0">
-                <a:latin typeface="Segoe UI" panose="020B0502040204020203" pitchFamily="34" charset="0"/>
-                <a:cs typeface="Segoe UI" panose="020B0502040204020203" pitchFamily="34" charset="0"/>
-              </a:rPr>
-              <a:t>Smart Lookup brings research directly in to PowerPoint.</a:t>
-            </a:r>
-            <a:br>
-              <a:rPr lang="en-US" dirty="0">
-                <a:latin typeface="Segoe UI" panose="020B0502040204020203" pitchFamily="34" charset="0"/>
-                <a:cs typeface="Segoe UI" panose="020B0502040204020203" pitchFamily="34" charset="0"/>
-              </a:rPr>
-            </a:br>
-            <a:br>
-              <a:rPr lang="en-US" dirty="0">
-                <a:latin typeface="Segoe UI" panose="020B0502040204020203" pitchFamily="34" charset="0"/>
-                <a:cs typeface="Segoe UI" panose="020B0502040204020203" pitchFamily="34" charset="0"/>
-              </a:rPr>
-            </a:br>
-            <a:r>
-              <a:rPr lang="en-US" dirty="0">
-                <a:latin typeface="Segoe UI" panose="020B0502040204020203" pitchFamily="34" charset="0"/>
-                <a:cs typeface="Segoe UI" panose="020B0502040204020203" pitchFamily="34" charset="0"/>
-              </a:rPr>
-              <a:t>Try it:</a:t>
-            </a:r>
-          </a:p>
-        </p:txBody>
-      </p:sp>
-      <p:pic>
-        <p:nvPicPr>
-          <p:cNvPr id="18" name="Picture 17" descr="Three pictures showing the Smart Lookup feature"/>
-          <p:cNvPicPr>
-            <a:picLocks noChangeAspect="1"/>
-          </p:cNvPicPr>
-          <p:nvPr/>
-        </p:nvPicPr>
-        <p:blipFill>
-          <a:blip r:embed="rId2" cstate="print">
-            <a:extLst>
-              <a:ext uri="{28A0092B-C50C-407E-A947-70E740481C1C}">
-                <a14:useLocalDpi xmlns:a14="http://schemas.microsoft.com/office/drawing/2010/main" val="0"/>
-              </a:ext>
-            </a:extLst>
-          </a:blip>
-          <a:stretch>
-            <a:fillRect/>
-          </a:stretch>
-        </p:blipFill>
-        <p:spPr>
-          <a:xfrm>
-            <a:off x="494408" y="2144574"/>
-            <a:ext cx="11129521" cy="3198055"/>
-          </a:xfrm>
-          <a:prstGeom prst="rect">
-            <a:avLst/>
-          </a:prstGeom>
-        </p:spPr>
-      </p:pic>
-      <p:grpSp>
-        <p:nvGrpSpPr>
-          <p:cNvPr id="33" name="Group 32" descr="Small circle with number 1 inside  indicating step 1"/>
-          <p:cNvGrpSpPr/>
-          <p:nvPr/>
-        </p:nvGrpSpPr>
-        <p:grpSpPr bwMode="blackWhite">
-          <a:xfrm>
-            <a:off x="558723" y="5233381"/>
-            <a:ext cx="558179" cy="409838"/>
-            <a:chOff x="6953426" y="711274"/>
-            <a:chExt cx="558179" cy="409838"/>
-          </a:xfrm>
-        </p:grpSpPr>
-        <p:sp>
-          <p:nvSpPr>
-            <p:cNvPr id="34" name="Oval 33" descr="Small circle"/>
-            <p:cNvSpPr/>
-            <p:nvPr/>
-          </p:nvSpPr>
-          <p:spPr bwMode="blackWhite">
-            <a:xfrm>
-              <a:off x="7025069" y="711274"/>
-              <a:ext cx="409838" cy="409838"/>
-            </a:xfrm>
-            <a:prstGeom prst="ellipse">
-              <a:avLst/>
-            </a:prstGeom>
-            <a:solidFill>
-              <a:srgbClr val="D24726"/>
-            </a:solidFill>
-            <a:ln>
-              <a:noFill/>
-            </a:ln>
-          </p:spPr>
-          <p:style>
-            <a:lnRef idx="2">
-              <a:schemeClr val="accent1">
-                <a:shade val="50000"/>
-              </a:schemeClr>
-            </a:lnRef>
-            <a:fillRef idx="1">
-              <a:schemeClr val="accent1"/>
-            </a:fillRef>
-            <a:effectRef idx="0">
-              <a:schemeClr val="accent1"/>
-            </a:effectRef>
-            <a:fontRef idx="minor">
-              <a:schemeClr val="lt1"/>
-            </a:fontRef>
-          </p:style>
-          <p:txBody>
-            <a:bodyPr rtlCol="0" anchor="ctr"/>
-            <a:lstStyle/>
-            <a:p>
-              <a:pPr algn="ctr"/>
-              <a:endParaRPr lang="en-US" dirty="0"/>
-            </a:p>
-          </p:txBody>
-        </p:sp>
-        <p:sp>
-          <p:nvSpPr>
-            <p:cNvPr id="35" name="TextBox 34" descr="Number 1"/>
-            <p:cNvSpPr txBox="1"/>
-            <p:nvPr/>
-          </p:nvSpPr>
-          <p:spPr bwMode="blackWhite">
-            <a:xfrm>
-              <a:off x="6953426" y="727564"/>
-              <a:ext cx="558179" cy="369332"/>
-            </a:xfrm>
-            <a:prstGeom prst="rect">
-              <a:avLst/>
-            </a:prstGeom>
-            <a:noFill/>
-          </p:spPr>
-          <p:txBody>
-            <a:bodyPr wrap="square" rtlCol="0">
-              <a:spAutoFit/>
-            </a:bodyPr>
-            <a:lstStyle/>
-            <a:p>
-              <a:pPr algn="ctr"/>
-              <a:r>
-                <a:rPr lang="en-US" dirty="0">
-                  <a:solidFill>
-                    <a:schemeClr val="bg1"/>
-                  </a:solidFill>
-                  <a:latin typeface="Segoe UI Semibold" panose="020B0702040204020203" pitchFamily="34" charset="0"/>
-                  <a:cs typeface="Segoe UI Semibold" panose="020B0702040204020203" pitchFamily="34" charset="0"/>
-                </a:rPr>
-                <a:t>1</a:t>
-              </a:r>
-            </a:p>
-          </p:txBody>
-        </p:sp>
-      </p:grpSp>
-      <p:sp>
-        <p:nvSpPr>
-          <p:cNvPr id="42" name="Content Placeholder 17"/>
-          <p:cNvSpPr txBox="1">
-            <a:spLocks/>
-          </p:cNvSpPr>
-          <p:nvPr/>
-        </p:nvSpPr>
-        <p:spPr>
-          <a:xfrm>
-            <a:off x="1066038" y="5273573"/>
-            <a:ext cx="2919669" cy="1298398"/>
-          </a:xfrm>
-          <a:prstGeom prst="rect">
-            <a:avLst/>
-          </a:prstGeom>
-        </p:spPr>
-        <p:txBody>
-          <a:bodyPr vert="horz" lIns="91440" tIns="45720" rIns="91440" bIns="45720" rtlCol="0">
-            <a:normAutofit/>
-          </a:bodyPr>
-          <a:lstStyle>
-            <a:lvl1pPr marL="228600" indent="-228600" algn="l" defTabSz="914400" rtl="0" eaLnBrk="1" latinLnBrk="0" hangingPunct="1">
-              <a:lnSpc>
-                <a:spcPts val="1800"/>
-              </a:lnSpc>
-              <a:spcBef>
-                <a:spcPts val="1000"/>
-              </a:spcBef>
-              <a:spcAft>
-                <a:spcPts val="1000"/>
-              </a:spcAft>
-              <a:buFont typeface="Arial" panose="020B0604020202020204" pitchFamily="34" charset="0"/>
-              <a:buChar char="•"/>
-              <a:defRPr lang="en-US" sz="1200" kern="1200" smtClean="0">
-                <a:solidFill>
-                  <a:schemeClr val="tx1">
-                    <a:lumMod val="75000"/>
-                    <a:lumOff val="25000"/>
-                  </a:schemeClr>
-                </a:solidFill>
-                <a:latin typeface="+mn-lt"/>
-                <a:ea typeface="+mn-ea"/>
-                <a:cs typeface="+mn-cs"/>
-              </a:defRPr>
-            </a:lvl1pPr>
-            <a:lvl2pPr marL="685800" indent="-228600" algn="l" defTabSz="914400" rtl="0" eaLnBrk="1" latinLnBrk="0" hangingPunct="1">
-              <a:lnSpc>
-                <a:spcPts val="1800"/>
-              </a:lnSpc>
-              <a:spcBef>
-                <a:spcPts val="1000"/>
-              </a:spcBef>
-              <a:spcAft>
-                <a:spcPts val="1000"/>
-              </a:spcAft>
-              <a:buFont typeface="Arial" panose="020B0604020202020204" pitchFamily="34" charset="0"/>
-              <a:buChar char="•"/>
-              <a:defRPr lang="en-US" sz="1200" kern="1200" smtClean="0">
-                <a:solidFill>
-                  <a:schemeClr val="tx1">
-                    <a:lumMod val="75000"/>
-                    <a:lumOff val="25000"/>
-                  </a:schemeClr>
-                </a:solidFill>
-                <a:latin typeface="+mn-lt"/>
-                <a:ea typeface="+mn-ea"/>
-                <a:cs typeface="+mn-cs"/>
-              </a:defRPr>
-            </a:lvl2pPr>
-            <a:lvl3pPr marL="1143000" indent="-228600" algn="l" defTabSz="914400" rtl="0" eaLnBrk="1" latinLnBrk="0" hangingPunct="1">
-              <a:lnSpc>
-                <a:spcPts val="1800"/>
-              </a:lnSpc>
-              <a:spcBef>
-                <a:spcPts val="1000"/>
-              </a:spcBef>
-              <a:spcAft>
-                <a:spcPts val="1000"/>
-              </a:spcAft>
-              <a:buFont typeface="Arial" panose="020B0604020202020204" pitchFamily="34" charset="0"/>
-              <a:buChar char="•"/>
-              <a:defRPr lang="en-US" sz="1200" kern="1200" smtClean="0">
-                <a:solidFill>
-                  <a:schemeClr val="tx1">
-                    <a:lumMod val="75000"/>
-                    <a:lumOff val="25000"/>
-                  </a:schemeClr>
-                </a:solidFill>
-                <a:latin typeface="+mn-lt"/>
-                <a:ea typeface="+mn-ea"/>
-                <a:cs typeface="+mn-cs"/>
-              </a:defRPr>
-            </a:lvl3pPr>
-            <a:lvl4pPr marL="1600200" indent="-228600" algn="l" defTabSz="914400" rtl="0" eaLnBrk="1" latinLnBrk="0" hangingPunct="1">
-              <a:lnSpc>
-                <a:spcPts val="1800"/>
-              </a:lnSpc>
-              <a:spcBef>
-                <a:spcPts val="1000"/>
-              </a:spcBef>
-              <a:spcAft>
-                <a:spcPts val="1000"/>
-              </a:spcAft>
-              <a:buFont typeface="Arial" panose="020B0604020202020204" pitchFamily="34" charset="0"/>
-              <a:buChar char="•"/>
-              <a:defRPr lang="en-US" sz="1200" kern="1200" smtClean="0">
-                <a:solidFill>
-                  <a:schemeClr val="tx1">
-                    <a:lumMod val="75000"/>
-                    <a:lumOff val="25000"/>
-                  </a:schemeClr>
-                </a:solidFill>
-                <a:latin typeface="+mn-lt"/>
-                <a:ea typeface="+mn-ea"/>
-                <a:cs typeface="+mn-cs"/>
-              </a:defRPr>
-            </a:lvl4pPr>
-            <a:lvl5pPr marL="2057400" indent="-228600" algn="l" defTabSz="914400" rtl="0" eaLnBrk="1" latinLnBrk="0" hangingPunct="1">
-              <a:lnSpc>
-                <a:spcPts val="1800"/>
-              </a:lnSpc>
-              <a:spcBef>
-                <a:spcPts val="1000"/>
-              </a:spcBef>
-              <a:spcAft>
-                <a:spcPts val="1000"/>
-              </a:spcAft>
-              <a:buFont typeface="Arial" panose="020B0604020202020204" pitchFamily="34" charset="0"/>
-              <a:buChar char="•"/>
-              <a:defRPr lang="en-US" sz="1200" kern="1200">
-                <a:solidFill>
-                  <a:schemeClr val="tx1">
-                    <a:lumMod val="75000"/>
-                    <a:lumOff val="25000"/>
-                  </a:schemeClr>
-                </a:solidFill>
-                <a:latin typeface="+mn-lt"/>
-                <a:ea typeface="+mn-ea"/>
-                <a:cs typeface="+mn-cs"/>
-              </a:defRPr>
-            </a:lvl5pPr>
-            <a:lvl6pPr marL="2514600" indent="-228600" algn="l" defTabSz="914400" rtl="0" eaLnBrk="1" latinLnBrk="0" hangingPunct="1">
-              <a:lnSpc>
-                <a:spcPct val="90000"/>
-              </a:lnSpc>
-              <a:spcBef>
-                <a:spcPct val="30000"/>
-              </a:spcBef>
-              <a:buFont typeface="Arial" panose="020B0604020202020204" pitchFamily="34" charset="0"/>
-              <a:buChar char="•"/>
-              <a:defRPr sz="1800" kern="1200">
-                <a:solidFill>
-                  <a:schemeClr val="tx1"/>
-                </a:solidFill>
-                <a:latin typeface="+mn-lt"/>
-                <a:ea typeface="+mn-ea"/>
-                <a:cs typeface="+mn-cs"/>
-              </a:defRPr>
-            </a:lvl6pPr>
-            <a:lvl7pPr marL="2971800" indent="-228600" algn="l" defTabSz="914400" rtl="0" eaLnBrk="1" latinLnBrk="0" hangingPunct="1">
-              <a:lnSpc>
-                <a:spcPct val="90000"/>
-              </a:lnSpc>
-              <a:spcBef>
-                <a:spcPct val="30000"/>
-              </a:spcBef>
-              <a:buFont typeface="Arial" panose="020B0604020202020204" pitchFamily="34" charset="0"/>
-              <a:buChar char="•"/>
-              <a:defRPr sz="1800" kern="1200">
-                <a:solidFill>
-                  <a:schemeClr val="tx1"/>
-                </a:solidFill>
-                <a:latin typeface="+mn-lt"/>
-                <a:ea typeface="+mn-ea"/>
-                <a:cs typeface="+mn-cs"/>
-              </a:defRPr>
-            </a:lvl7pPr>
-            <a:lvl8pPr marL="3429000" indent="-228600" algn="l" defTabSz="914400" rtl="0" eaLnBrk="1" latinLnBrk="0" hangingPunct="1">
-              <a:lnSpc>
-                <a:spcPct val="90000"/>
-              </a:lnSpc>
-              <a:spcBef>
-                <a:spcPct val="30000"/>
-              </a:spcBef>
-              <a:buFont typeface="Arial" panose="020B0604020202020204" pitchFamily="34" charset="0"/>
-              <a:buChar char="•"/>
-              <a:defRPr sz="1800" kern="1200">
-                <a:solidFill>
-                  <a:schemeClr val="tx1"/>
-                </a:solidFill>
-                <a:latin typeface="+mn-lt"/>
-                <a:ea typeface="+mn-ea"/>
-                <a:cs typeface="+mn-cs"/>
-              </a:defRPr>
-            </a:lvl8pPr>
-            <a:lvl9pPr marL="3886200" indent="-228600" algn="l" defTabSz="914400" rtl="0" eaLnBrk="1" latinLnBrk="0" hangingPunct="1">
-              <a:lnSpc>
-                <a:spcPct val="90000"/>
-              </a:lnSpc>
-              <a:spcBef>
-                <a:spcPct val="30000"/>
-              </a:spcBef>
-              <a:buFont typeface="Arial" panose="020B0604020202020204" pitchFamily="34" charset="0"/>
-              <a:buChar char="•"/>
-              <a:defRPr sz="1800" kern="1200">
-                <a:solidFill>
-                  <a:schemeClr val="tx1"/>
-                </a:solidFill>
-                <a:latin typeface="+mn-lt"/>
-                <a:ea typeface="+mn-ea"/>
-                <a:cs typeface="+mn-cs"/>
-              </a:defRPr>
-            </a:lvl9pPr>
-          </a:lstStyle>
-          <a:p>
-            <a:pPr marL="0" indent="0">
-              <a:spcAft>
-                <a:spcPts val="2000"/>
-              </a:spcAft>
-              <a:buNone/>
-            </a:pPr>
-            <a:r>
-              <a:rPr lang="en-US" dirty="0">
-                <a:solidFill>
-                  <a:prstClr val="black">
-                    <a:lumMod val="75000"/>
-                    <a:lumOff val="25000"/>
-                  </a:prstClr>
-                </a:solidFill>
-                <a:latin typeface="Segoe UI" panose="020B0502040204020203" pitchFamily="34" charset="0"/>
-                <a:cs typeface="Segoe UI" panose="020B0502040204020203" pitchFamily="34" charset="0"/>
-              </a:rPr>
-              <a:t>Right-click in the word </a:t>
-            </a:r>
-            <a:r>
-              <a:rPr lang="en-US" i="1" dirty="0">
-                <a:solidFill>
-                  <a:srgbClr val="D24726"/>
-                </a:solidFill>
-                <a:latin typeface="Segoe UI" panose="020B0502040204020203" pitchFamily="34" charset="0"/>
-                <a:cs typeface="Segoe UI" panose="020B0502040204020203" pitchFamily="34" charset="0"/>
-              </a:rPr>
-              <a:t>office</a:t>
-            </a:r>
-            <a:r>
-              <a:rPr lang="en-US" dirty="0">
-                <a:solidFill>
-                  <a:prstClr val="black">
-                    <a:lumMod val="75000"/>
-                    <a:lumOff val="25000"/>
-                  </a:prstClr>
-                </a:solidFill>
-                <a:latin typeface="Segoe UI" panose="020B0502040204020203" pitchFamily="34" charset="0"/>
-                <a:cs typeface="Segoe UI" panose="020B0502040204020203" pitchFamily="34" charset="0"/>
-              </a:rPr>
-              <a:t> in the following phrase: </a:t>
-            </a:r>
-            <a:r>
-              <a:rPr lang="en-US" sz="1800" dirty="0">
-                <a:solidFill>
-                  <a:prstClr val="black">
-                    <a:lumMod val="75000"/>
-                    <a:lumOff val="25000"/>
-                  </a:prstClr>
-                </a:solidFill>
-                <a:latin typeface="Segoe UI" panose="020B0502040204020203" pitchFamily="34" charset="0"/>
-                <a:cs typeface="Segoe UI" panose="020B0502040204020203" pitchFamily="34" charset="0"/>
-              </a:rPr>
-              <a:t>office furniture</a:t>
-            </a:r>
-          </a:p>
-        </p:txBody>
-      </p:sp>
-      <p:grpSp>
-        <p:nvGrpSpPr>
-          <p:cNvPr id="36" name="Group 35" descr="Small circle with number 2 inside  indicating step 2"/>
-          <p:cNvGrpSpPr/>
-          <p:nvPr/>
-        </p:nvGrpSpPr>
-        <p:grpSpPr bwMode="blackWhite">
-          <a:xfrm>
-            <a:off x="4249102" y="5233381"/>
-            <a:ext cx="558179" cy="409838"/>
-            <a:chOff x="6953426" y="711274"/>
-            <a:chExt cx="558179" cy="409838"/>
-          </a:xfrm>
-        </p:grpSpPr>
-        <p:sp>
-          <p:nvSpPr>
-            <p:cNvPr id="37" name="Oval 36" descr="Small circle"/>
-            <p:cNvSpPr/>
-            <p:nvPr/>
-          </p:nvSpPr>
-          <p:spPr bwMode="blackWhite">
-            <a:xfrm>
-              <a:off x="7025069" y="711274"/>
-              <a:ext cx="409838" cy="409838"/>
-            </a:xfrm>
-            <a:prstGeom prst="ellipse">
-              <a:avLst/>
-            </a:prstGeom>
-            <a:solidFill>
-              <a:srgbClr val="D24726"/>
-            </a:solidFill>
-            <a:ln>
-              <a:noFill/>
-            </a:ln>
-          </p:spPr>
-          <p:style>
-            <a:lnRef idx="2">
-              <a:schemeClr val="accent1">
-                <a:shade val="50000"/>
-              </a:schemeClr>
-            </a:lnRef>
-            <a:fillRef idx="1">
-              <a:schemeClr val="accent1"/>
-            </a:fillRef>
-            <a:effectRef idx="0">
-              <a:schemeClr val="accent1"/>
-            </a:effectRef>
-            <a:fontRef idx="minor">
-              <a:schemeClr val="lt1"/>
-            </a:fontRef>
-          </p:style>
-          <p:txBody>
-            <a:bodyPr rtlCol="0" anchor="ctr"/>
-            <a:lstStyle/>
-            <a:p>
-              <a:pPr algn="ctr"/>
-              <a:endParaRPr lang="en-US" dirty="0"/>
-            </a:p>
-          </p:txBody>
-        </p:sp>
-        <p:sp>
-          <p:nvSpPr>
-            <p:cNvPr id="38" name="TextBox 37" descr="Number 2"/>
-            <p:cNvSpPr txBox="1"/>
-            <p:nvPr/>
-          </p:nvSpPr>
-          <p:spPr bwMode="blackWhite">
-            <a:xfrm>
-              <a:off x="6953426" y="727564"/>
-              <a:ext cx="558179" cy="369332"/>
-            </a:xfrm>
-            <a:prstGeom prst="rect">
-              <a:avLst/>
-            </a:prstGeom>
-            <a:noFill/>
-          </p:spPr>
-          <p:txBody>
-            <a:bodyPr wrap="square" rtlCol="0">
-              <a:spAutoFit/>
-            </a:bodyPr>
-            <a:lstStyle/>
-            <a:p>
-              <a:pPr algn="ctr"/>
-              <a:r>
-                <a:rPr lang="en-US" dirty="0">
-                  <a:solidFill>
-                    <a:schemeClr val="bg1"/>
-                  </a:solidFill>
-                  <a:latin typeface="Segoe UI Semibold" panose="020B0702040204020203" pitchFamily="34" charset="0"/>
-                  <a:cs typeface="Segoe UI Semibold" panose="020B0702040204020203" pitchFamily="34" charset="0"/>
-                </a:rPr>
-                <a:t>2</a:t>
-              </a:r>
-            </a:p>
-          </p:txBody>
-        </p:sp>
-      </p:grpSp>
-      <p:sp>
-        <p:nvSpPr>
-          <p:cNvPr id="43" name="Content Placeholder 17"/>
-          <p:cNvSpPr txBox="1">
-            <a:spLocks/>
-          </p:cNvSpPr>
-          <p:nvPr/>
-        </p:nvSpPr>
-        <p:spPr>
-          <a:xfrm>
-            <a:off x="4747855" y="5273573"/>
-            <a:ext cx="3106367" cy="1324053"/>
-          </a:xfrm>
-          <a:prstGeom prst="rect">
-            <a:avLst/>
-          </a:prstGeom>
-        </p:spPr>
-        <p:txBody>
-          <a:bodyPr vert="horz" lIns="91440" tIns="45720" rIns="91440" bIns="45720" rtlCol="0">
-            <a:normAutofit/>
-          </a:bodyPr>
-          <a:lstStyle>
-            <a:lvl1pPr marL="228600" indent="-228600" algn="l" defTabSz="914400" rtl="0" eaLnBrk="1" latinLnBrk="0" hangingPunct="1">
-              <a:lnSpc>
-                <a:spcPts val="1800"/>
-              </a:lnSpc>
-              <a:spcBef>
-                <a:spcPts val="1000"/>
-              </a:spcBef>
-              <a:spcAft>
-                <a:spcPts val="1000"/>
-              </a:spcAft>
-              <a:buFont typeface="Arial" panose="020B0604020202020204" pitchFamily="34" charset="0"/>
-              <a:buChar char="•"/>
-              <a:defRPr lang="en-US" sz="1200" kern="1200" smtClean="0">
-                <a:solidFill>
-                  <a:schemeClr val="tx1">
-                    <a:lumMod val="75000"/>
-                    <a:lumOff val="25000"/>
-                  </a:schemeClr>
-                </a:solidFill>
-                <a:latin typeface="+mn-lt"/>
-                <a:ea typeface="+mn-ea"/>
-                <a:cs typeface="+mn-cs"/>
-              </a:defRPr>
-            </a:lvl1pPr>
-            <a:lvl2pPr marL="685800" indent="-228600" algn="l" defTabSz="914400" rtl="0" eaLnBrk="1" latinLnBrk="0" hangingPunct="1">
-              <a:lnSpc>
-                <a:spcPts val="1800"/>
-              </a:lnSpc>
-              <a:spcBef>
-                <a:spcPts val="1000"/>
-              </a:spcBef>
-              <a:spcAft>
-                <a:spcPts val="1000"/>
-              </a:spcAft>
-              <a:buFont typeface="Arial" panose="020B0604020202020204" pitchFamily="34" charset="0"/>
-              <a:buChar char="•"/>
-              <a:defRPr lang="en-US" sz="1200" kern="1200" smtClean="0">
-                <a:solidFill>
-                  <a:schemeClr val="tx1">
-                    <a:lumMod val="75000"/>
-                    <a:lumOff val="25000"/>
-                  </a:schemeClr>
-                </a:solidFill>
-                <a:latin typeface="+mn-lt"/>
-                <a:ea typeface="+mn-ea"/>
-                <a:cs typeface="+mn-cs"/>
-              </a:defRPr>
-            </a:lvl2pPr>
-            <a:lvl3pPr marL="1143000" indent="-228600" algn="l" defTabSz="914400" rtl="0" eaLnBrk="1" latinLnBrk="0" hangingPunct="1">
-              <a:lnSpc>
-                <a:spcPts val="1800"/>
-              </a:lnSpc>
-              <a:spcBef>
-                <a:spcPts val="1000"/>
-              </a:spcBef>
-              <a:spcAft>
-                <a:spcPts val="1000"/>
-              </a:spcAft>
-              <a:buFont typeface="Arial" panose="020B0604020202020204" pitchFamily="34" charset="0"/>
-              <a:buChar char="•"/>
-              <a:defRPr lang="en-US" sz="1200" kern="1200" smtClean="0">
-                <a:solidFill>
-                  <a:schemeClr val="tx1">
-                    <a:lumMod val="75000"/>
-                    <a:lumOff val="25000"/>
-                  </a:schemeClr>
-                </a:solidFill>
-                <a:latin typeface="+mn-lt"/>
-                <a:ea typeface="+mn-ea"/>
-                <a:cs typeface="+mn-cs"/>
-              </a:defRPr>
-            </a:lvl3pPr>
-            <a:lvl4pPr marL="1600200" indent="-228600" algn="l" defTabSz="914400" rtl="0" eaLnBrk="1" latinLnBrk="0" hangingPunct="1">
-              <a:lnSpc>
-                <a:spcPts val="1800"/>
-              </a:lnSpc>
-              <a:spcBef>
-                <a:spcPts val="1000"/>
-              </a:spcBef>
-              <a:spcAft>
-                <a:spcPts val="1000"/>
-              </a:spcAft>
-              <a:buFont typeface="Arial" panose="020B0604020202020204" pitchFamily="34" charset="0"/>
-              <a:buChar char="•"/>
-              <a:defRPr lang="en-US" sz="1200" kern="1200" smtClean="0">
-                <a:solidFill>
-                  <a:schemeClr val="tx1">
-                    <a:lumMod val="75000"/>
-                    <a:lumOff val="25000"/>
-                  </a:schemeClr>
-                </a:solidFill>
-                <a:latin typeface="+mn-lt"/>
-                <a:ea typeface="+mn-ea"/>
-                <a:cs typeface="+mn-cs"/>
-              </a:defRPr>
-            </a:lvl4pPr>
-            <a:lvl5pPr marL="2057400" indent="-228600" algn="l" defTabSz="914400" rtl="0" eaLnBrk="1" latinLnBrk="0" hangingPunct="1">
-              <a:lnSpc>
-                <a:spcPts val="1800"/>
-              </a:lnSpc>
-              <a:spcBef>
-                <a:spcPts val="1000"/>
-              </a:spcBef>
-              <a:spcAft>
-                <a:spcPts val="1000"/>
-              </a:spcAft>
-              <a:buFont typeface="Arial" panose="020B0604020202020204" pitchFamily="34" charset="0"/>
-              <a:buChar char="•"/>
-              <a:defRPr lang="en-US" sz="1200" kern="1200">
-                <a:solidFill>
-                  <a:schemeClr val="tx1">
-                    <a:lumMod val="75000"/>
-                    <a:lumOff val="25000"/>
-                  </a:schemeClr>
-                </a:solidFill>
-                <a:latin typeface="+mn-lt"/>
-                <a:ea typeface="+mn-ea"/>
-                <a:cs typeface="+mn-cs"/>
-              </a:defRPr>
-            </a:lvl5pPr>
-            <a:lvl6pPr marL="2514600" indent="-228600" algn="l" defTabSz="914400" rtl="0" eaLnBrk="1" latinLnBrk="0" hangingPunct="1">
-              <a:lnSpc>
-                <a:spcPct val="90000"/>
-              </a:lnSpc>
-              <a:spcBef>
-                <a:spcPct val="30000"/>
-              </a:spcBef>
-              <a:buFont typeface="Arial" panose="020B0604020202020204" pitchFamily="34" charset="0"/>
-              <a:buChar char="•"/>
-              <a:defRPr sz="1800" kern="1200">
-                <a:solidFill>
-                  <a:schemeClr val="tx1"/>
-                </a:solidFill>
-                <a:latin typeface="+mn-lt"/>
-                <a:ea typeface="+mn-ea"/>
-                <a:cs typeface="+mn-cs"/>
-              </a:defRPr>
-            </a:lvl6pPr>
-            <a:lvl7pPr marL="2971800" indent="-228600" algn="l" defTabSz="914400" rtl="0" eaLnBrk="1" latinLnBrk="0" hangingPunct="1">
-              <a:lnSpc>
-                <a:spcPct val="90000"/>
-              </a:lnSpc>
-              <a:spcBef>
-                <a:spcPct val="30000"/>
-              </a:spcBef>
-              <a:buFont typeface="Arial" panose="020B0604020202020204" pitchFamily="34" charset="0"/>
-              <a:buChar char="•"/>
-              <a:defRPr sz="1800" kern="1200">
-                <a:solidFill>
-                  <a:schemeClr val="tx1"/>
-                </a:solidFill>
-                <a:latin typeface="+mn-lt"/>
-                <a:ea typeface="+mn-ea"/>
-                <a:cs typeface="+mn-cs"/>
-              </a:defRPr>
-            </a:lvl7pPr>
-            <a:lvl8pPr marL="3429000" indent="-228600" algn="l" defTabSz="914400" rtl="0" eaLnBrk="1" latinLnBrk="0" hangingPunct="1">
-              <a:lnSpc>
-                <a:spcPct val="90000"/>
-              </a:lnSpc>
-              <a:spcBef>
-                <a:spcPct val="30000"/>
-              </a:spcBef>
-              <a:buFont typeface="Arial" panose="020B0604020202020204" pitchFamily="34" charset="0"/>
-              <a:buChar char="•"/>
-              <a:defRPr sz="1800" kern="1200">
-                <a:solidFill>
-                  <a:schemeClr val="tx1"/>
-                </a:solidFill>
-                <a:latin typeface="+mn-lt"/>
-                <a:ea typeface="+mn-ea"/>
-                <a:cs typeface="+mn-cs"/>
-              </a:defRPr>
-            </a:lvl8pPr>
-            <a:lvl9pPr marL="3886200" indent="-228600" algn="l" defTabSz="914400" rtl="0" eaLnBrk="1" latinLnBrk="0" hangingPunct="1">
-              <a:lnSpc>
-                <a:spcPct val="90000"/>
-              </a:lnSpc>
-              <a:spcBef>
-                <a:spcPct val="30000"/>
-              </a:spcBef>
-              <a:buFont typeface="Arial" panose="020B0604020202020204" pitchFamily="34" charset="0"/>
-              <a:buChar char="•"/>
-              <a:defRPr sz="1800" kern="1200">
-                <a:solidFill>
-                  <a:schemeClr val="tx1"/>
-                </a:solidFill>
-                <a:latin typeface="+mn-lt"/>
-                <a:ea typeface="+mn-ea"/>
-                <a:cs typeface="+mn-cs"/>
-              </a:defRPr>
-            </a:lvl9pPr>
-          </a:lstStyle>
-          <a:p>
-            <a:pPr marL="0" indent="0">
-              <a:spcAft>
-                <a:spcPts val="2000"/>
-              </a:spcAft>
-              <a:buNone/>
-            </a:pPr>
-            <a:r>
-              <a:rPr lang="en-US" dirty="0">
-                <a:solidFill>
-                  <a:prstClr val="black">
-                    <a:lumMod val="75000"/>
-                    <a:lumOff val="25000"/>
-                  </a:prstClr>
-                </a:solidFill>
-                <a:latin typeface="Segoe UI" panose="020B0502040204020203" pitchFamily="34" charset="0"/>
-                <a:cs typeface="Segoe UI" panose="020B0502040204020203" pitchFamily="34" charset="0"/>
-              </a:rPr>
-              <a:t>Choose </a:t>
-            </a:r>
-            <a:r>
-              <a:rPr lang="en-US" dirty="0">
-                <a:solidFill>
-                  <a:srgbClr val="D24726"/>
-                </a:solidFill>
-                <a:latin typeface="Segoe UI Semibold" panose="020B0702040204020203" pitchFamily="34" charset="0"/>
-                <a:cs typeface="Segoe UI Semibold" panose="020B0702040204020203" pitchFamily="34" charset="0"/>
-              </a:rPr>
-              <a:t>Smart</a:t>
-            </a:r>
-            <a:r>
-              <a:rPr lang="en-US" dirty="0">
-                <a:solidFill>
-                  <a:prstClr val="black">
-                    <a:lumMod val="75000"/>
-                    <a:lumOff val="25000"/>
-                  </a:prstClr>
-                </a:solidFill>
-                <a:cs typeface="Segoe UI"/>
-              </a:rPr>
-              <a:t> </a:t>
-            </a:r>
-            <a:r>
-              <a:rPr lang="en-US" dirty="0">
-                <a:solidFill>
-                  <a:srgbClr val="D24726"/>
-                </a:solidFill>
-                <a:latin typeface="Segoe UI Semibold" panose="020B0702040204020203" pitchFamily="34" charset="0"/>
-                <a:cs typeface="Segoe UI Semibold" panose="020B0702040204020203" pitchFamily="34" charset="0"/>
-              </a:rPr>
-              <a:t>Lookup</a:t>
-            </a:r>
-            <a:r>
-              <a:rPr lang="en-US" dirty="0">
-                <a:latin typeface="Segoe UI" panose="020B0502040204020203" pitchFamily="34" charset="0"/>
-                <a:cs typeface="Segoe UI" panose="020B0502040204020203" pitchFamily="34" charset="0"/>
-              </a:rPr>
-              <a:t>, and notice that results are contextual for that phrase, not </a:t>
-            </a:r>
-            <a:r>
-              <a:rPr lang="en-US" sz="1800" dirty="0">
-                <a:latin typeface="Segoe UI" panose="020B0502040204020203" pitchFamily="34" charset="0"/>
-                <a:cs typeface="Segoe UI" panose="020B0502040204020203" pitchFamily="34" charset="0"/>
-              </a:rPr>
-              <a:t>Microsoft Office apps</a:t>
-            </a:r>
-            <a:r>
-              <a:rPr lang="en-US" dirty="0">
-                <a:latin typeface="Segoe UI" panose="020B0502040204020203" pitchFamily="34" charset="0"/>
-                <a:cs typeface="Segoe UI" panose="020B0502040204020203" pitchFamily="34" charset="0"/>
-              </a:rPr>
-              <a:t>.</a:t>
-            </a:r>
-            <a:endParaRPr lang="en-US" dirty="0">
-              <a:solidFill>
-                <a:srgbClr val="D24726"/>
-              </a:solidFill>
-              <a:latin typeface="Segoe UI" panose="020B0502040204020203" pitchFamily="34" charset="0"/>
-              <a:cs typeface="Segoe UI" panose="020B0502040204020203" pitchFamily="34" charset="0"/>
-            </a:endParaRPr>
-          </a:p>
-        </p:txBody>
-      </p:sp>
-      <p:grpSp>
-        <p:nvGrpSpPr>
-          <p:cNvPr id="39" name="Group 38" descr="Small circle with number 3 inside  indicating step 3"/>
-          <p:cNvGrpSpPr/>
-          <p:nvPr/>
-        </p:nvGrpSpPr>
-        <p:grpSpPr bwMode="blackWhite">
-          <a:xfrm>
-            <a:off x="7930921" y="5233381"/>
-            <a:ext cx="558179" cy="409838"/>
-            <a:chOff x="6953426" y="711274"/>
-            <a:chExt cx="558179" cy="409838"/>
-          </a:xfrm>
-        </p:grpSpPr>
-        <p:sp>
-          <p:nvSpPr>
-            <p:cNvPr id="40" name="Oval 39" descr="Small circle"/>
-            <p:cNvSpPr/>
-            <p:nvPr/>
-          </p:nvSpPr>
-          <p:spPr bwMode="blackWhite">
-            <a:xfrm>
-              <a:off x="7025069" y="711274"/>
-              <a:ext cx="409838" cy="409838"/>
-            </a:xfrm>
-            <a:prstGeom prst="ellipse">
-              <a:avLst/>
-            </a:prstGeom>
-            <a:solidFill>
-              <a:srgbClr val="D24726"/>
-            </a:solidFill>
-            <a:ln>
-              <a:noFill/>
-            </a:ln>
-          </p:spPr>
-          <p:style>
-            <a:lnRef idx="2">
-              <a:schemeClr val="accent1">
-                <a:shade val="50000"/>
-              </a:schemeClr>
-            </a:lnRef>
-            <a:fillRef idx="1">
-              <a:schemeClr val="accent1"/>
-            </a:fillRef>
-            <a:effectRef idx="0">
-              <a:schemeClr val="accent1"/>
-            </a:effectRef>
-            <a:fontRef idx="minor">
-              <a:schemeClr val="lt1"/>
-            </a:fontRef>
-          </p:style>
-          <p:txBody>
-            <a:bodyPr rtlCol="0" anchor="ctr"/>
-            <a:lstStyle/>
-            <a:p>
-              <a:pPr algn="ctr"/>
-              <a:endParaRPr lang="en-US" dirty="0"/>
-            </a:p>
-          </p:txBody>
-        </p:sp>
-        <p:sp>
-          <p:nvSpPr>
-            <p:cNvPr id="41" name="TextBox 40" descr="Number 3"/>
-            <p:cNvSpPr txBox="1"/>
-            <p:nvPr/>
-          </p:nvSpPr>
-          <p:spPr bwMode="blackWhite">
-            <a:xfrm>
-              <a:off x="6953426" y="727564"/>
-              <a:ext cx="558179" cy="369332"/>
-            </a:xfrm>
-            <a:prstGeom prst="rect">
-              <a:avLst/>
-            </a:prstGeom>
-            <a:noFill/>
-          </p:spPr>
-          <p:txBody>
-            <a:bodyPr wrap="square" rtlCol="0">
-              <a:spAutoFit/>
-            </a:bodyPr>
-            <a:lstStyle/>
-            <a:p>
-              <a:pPr algn="ctr"/>
-              <a:r>
-                <a:rPr lang="en-US" dirty="0">
-                  <a:solidFill>
-                    <a:schemeClr val="bg1"/>
-                  </a:solidFill>
-                  <a:latin typeface="Segoe UI Semibold" panose="020B0702040204020203" pitchFamily="34" charset="0"/>
-                  <a:cs typeface="Segoe UI Semibold" panose="020B0702040204020203" pitchFamily="34" charset="0"/>
-                </a:rPr>
-                <a:t>3</a:t>
-              </a:r>
-            </a:p>
-          </p:txBody>
-        </p:sp>
-      </p:grpSp>
-      <p:sp>
-        <p:nvSpPr>
-          <p:cNvPr id="44" name="Content Placeholder 17"/>
-          <p:cNvSpPr txBox="1">
-            <a:spLocks/>
-          </p:cNvSpPr>
-          <p:nvPr/>
-        </p:nvSpPr>
-        <p:spPr>
-          <a:xfrm>
-            <a:off x="8429668" y="5273573"/>
-            <a:ext cx="3107336" cy="1341886"/>
-          </a:xfrm>
-          <a:prstGeom prst="rect">
-            <a:avLst/>
-          </a:prstGeom>
-        </p:spPr>
-        <p:txBody>
-          <a:bodyPr vert="horz" lIns="91440" tIns="45720" rIns="91440" bIns="45720" rtlCol="0">
-            <a:normAutofit/>
-          </a:bodyPr>
-          <a:lstStyle>
-            <a:lvl1pPr marL="228600" indent="-228600" algn="l" defTabSz="914400" rtl="0" eaLnBrk="1" latinLnBrk="0" hangingPunct="1">
-              <a:lnSpc>
-                <a:spcPts val="1800"/>
-              </a:lnSpc>
-              <a:spcBef>
-                <a:spcPts val="1000"/>
-              </a:spcBef>
-              <a:spcAft>
-                <a:spcPts val="1000"/>
-              </a:spcAft>
-              <a:buFont typeface="Arial" panose="020B0604020202020204" pitchFamily="34" charset="0"/>
-              <a:buChar char="•"/>
-              <a:defRPr lang="en-US" sz="1200" kern="1200" smtClean="0">
-                <a:solidFill>
-                  <a:schemeClr val="tx1">
-                    <a:lumMod val="75000"/>
-                    <a:lumOff val="25000"/>
-                  </a:schemeClr>
-                </a:solidFill>
-                <a:latin typeface="+mn-lt"/>
-                <a:ea typeface="+mn-ea"/>
-                <a:cs typeface="+mn-cs"/>
-              </a:defRPr>
-            </a:lvl1pPr>
-            <a:lvl2pPr marL="685800" indent="-228600" algn="l" defTabSz="914400" rtl="0" eaLnBrk="1" latinLnBrk="0" hangingPunct="1">
-              <a:lnSpc>
-                <a:spcPts val="1800"/>
-              </a:lnSpc>
-              <a:spcBef>
-                <a:spcPts val="1000"/>
-              </a:spcBef>
-              <a:spcAft>
-                <a:spcPts val="1000"/>
-              </a:spcAft>
-              <a:buFont typeface="Arial" panose="020B0604020202020204" pitchFamily="34" charset="0"/>
-              <a:buChar char="•"/>
-              <a:defRPr lang="en-US" sz="1200" kern="1200" smtClean="0">
-                <a:solidFill>
-                  <a:schemeClr val="tx1">
-                    <a:lumMod val="75000"/>
-                    <a:lumOff val="25000"/>
-                  </a:schemeClr>
-                </a:solidFill>
-                <a:latin typeface="+mn-lt"/>
-                <a:ea typeface="+mn-ea"/>
-                <a:cs typeface="+mn-cs"/>
-              </a:defRPr>
-            </a:lvl2pPr>
-            <a:lvl3pPr marL="1143000" indent="-228600" algn="l" defTabSz="914400" rtl="0" eaLnBrk="1" latinLnBrk="0" hangingPunct="1">
-              <a:lnSpc>
-                <a:spcPts val="1800"/>
-              </a:lnSpc>
-              <a:spcBef>
-                <a:spcPts val="1000"/>
-              </a:spcBef>
-              <a:spcAft>
-                <a:spcPts val="1000"/>
-              </a:spcAft>
-              <a:buFont typeface="Arial" panose="020B0604020202020204" pitchFamily="34" charset="0"/>
-              <a:buChar char="•"/>
-              <a:defRPr lang="en-US" sz="1200" kern="1200" smtClean="0">
-                <a:solidFill>
-                  <a:schemeClr val="tx1">
-                    <a:lumMod val="75000"/>
-                    <a:lumOff val="25000"/>
-                  </a:schemeClr>
-                </a:solidFill>
-                <a:latin typeface="+mn-lt"/>
-                <a:ea typeface="+mn-ea"/>
-                <a:cs typeface="+mn-cs"/>
-              </a:defRPr>
-            </a:lvl3pPr>
-            <a:lvl4pPr marL="1600200" indent="-228600" algn="l" defTabSz="914400" rtl="0" eaLnBrk="1" latinLnBrk="0" hangingPunct="1">
-              <a:lnSpc>
-                <a:spcPts val="1800"/>
-              </a:lnSpc>
-              <a:spcBef>
-                <a:spcPts val="1000"/>
-              </a:spcBef>
-              <a:spcAft>
-                <a:spcPts val="1000"/>
-              </a:spcAft>
-              <a:buFont typeface="Arial" panose="020B0604020202020204" pitchFamily="34" charset="0"/>
-              <a:buChar char="•"/>
-              <a:defRPr lang="en-US" sz="1200" kern="1200" smtClean="0">
-                <a:solidFill>
-                  <a:schemeClr val="tx1">
-                    <a:lumMod val="75000"/>
-                    <a:lumOff val="25000"/>
-                  </a:schemeClr>
-                </a:solidFill>
-                <a:latin typeface="+mn-lt"/>
-                <a:ea typeface="+mn-ea"/>
-                <a:cs typeface="+mn-cs"/>
-              </a:defRPr>
-            </a:lvl4pPr>
-            <a:lvl5pPr marL="2057400" indent="-228600" algn="l" defTabSz="914400" rtl="0" eaLnBrk="1" latinLnBrk="0" hangingPunct="1">
-              <a:lnSpc>
-                <a:spcPts val="1800"/>
-              </a:lnSpc>
-              <a:spcBef>
-                <a:spcPts val="1000"/>
-              </a:spcBef>
-              <a:spcAft>
-                <a:spcPts val="1000"/>
-              </a:spcAft>
-              <a:buFont typeface="Arial" panose="020B0604020202020204" pitchFamily="34" charset="0"/>
-              <a:buChar char="•"/>
-              <a:defRPr lang="en-US" sz="1200" kern="1200">
-                <a:solidFill>
-                  <a:schemeClr val="tx1">
-                    <a:lumMod val="75000"/>
-                    <a:lumOff val="25000"/>
-                  </a:schemeClr>
-                </a:solidFill>
-                <a:latin typeface="+mn-lt"/>
-                <a:ea typeface="+mn-ea"/>
-                <a:cs typeface="+mn-cs"/>
-              </a:defRPr>
-            </a:lvl5pPr>
-            <a:lvl6pPr marL="2514600" indent="-228600" algn="l" defTabSz="914400" rtl="0" eaLnBrk="1" latinLnBrk="0" hangingPunct="1">
-              <a:lnSpc>
-                <a:spcPct val="90000"/>
-              </a:lnSpc>
-              <a:spcBef>
-                <a:spcPct val="30000"/>
-              </a:spcBef>
-              <a:buFont typeface="Arial" panose="020B0604020202020204" pitchFamily="34" charset="0"/>
-              <a:buChar char="•"/>
-              <a:defRPr sz="1800" kern="1200">
-                <a:solidFill>
-                  <a:schemeClr val="tx1"/>
-                </a:solidFill>
-                <a:latin typeface="+mn-lt"/>
-                <a:ea typeface="+mn-ea"/>
-                <a:cs typeface="+mn-cs"/>
-              </a:defRPr>
-            </a:lvl6pPr>
-            <a:lvl7pPr marL="2971800" indent="-228600" algn="l" defTabSz="914400" rtl="0" eaLnBrk="1" latinLnBrk="0" hangingPunct="1">
-              <a:lnSpc>
-                <a:spcPct val="90000"/>
-              </a:lnSpc>
-              <a:spcBef>
-                <a:spcPct val="30000"/>
-              </a:spcBef>
-              <a:buFont typeface="Arial" panose="020B0604020202020204" pitchFamily="34" charset="0"/>
-              <a:buChar char="•"/>
-              <a:defRPr sz="1800" kern="1200">
-                <a:solidFill>
-                  <a:schemeClr val="tx1"/>
-                </a:solidFill>
-                <a:latin typeface="+mn-lt"/>
-                <a:ea typeface="+mn-ea"/>
-                <a:cs typeface="+mn-cs"/>
-              </a:defRPr>
-            </a:lvl7pPr>
-            <a:lvl8pPr marL="3429000" indent="-228600" algn="l" defTabSz="914400" rtl="0" eaLnBrk="1" latinLnBrk="0" hangingPunct="1">
-              <a:lnSpc>
-                <a:spcPct val="90000"/>
-              </a:lnSpc>
-              <a:spcBef>
-                <a:spcPct val="30000"/>
-              </a:spcBef>
-              <a:buFont typeface="Arial" panose="020B0604020202020204" pitchFamily="34" charset="0"/>
-              <a:buChar char="•"/>
-              <a:defRPr sz="1800" kern="1200">
-                <a:solidFill>
-                  <a:schemeClr val="tx1"/>
-                </a:solidFill>
-                <a:latin typeface="+mn-lt"/>
-                <a:ea typeface="+mn-ea"/>
-                <a:cs typeface="+mn-cs"/>
-              </a:defRPr>
-            </a:lvl8pPr>
-            <a:lvl9pPr marL="3886200" indent="-228600" algn="l" defTabSz="914400" rtl="0" eaLnBrk="1" latinLnBrk="0" hangingPunct="1">
-              <a:lnSpc>
-                <a:spcPct val="90000"/>
-              </a:lnSpc>
-              <a:spcBef>
-                <a:spcPct val="30000"/>
-              </a:spcBef>
-              <a:buFont typeface="Arial" panose="020B0604020202020204" pitchFamily="34" charset="0"/>
-              <a:buChar char="•"/>
-              <a:defRPr sz="1800" kern="1200">
-                <a:solidFill>
-                  <a:schemeClr val="tx1"/>
-                </a:solidFill>
-                <a:latin typeface="+mn-lt"/>
-                <a:ea typeface="+mn-ea"/>
-                <a:cs typeface="+mn-cs"/>
-              </a:defRPr>
-            </a:lvl9pPr>
-          </a:lstStyle>
-          <a:p>
-            <a:pPr marL="0" lvl="0" indent="0">
-              <a:spcAft>
-                <a:spcPts val="2000"/>
-              </a:spcAft>
-              <a:buNone/>
-            </a:pPr>
-            <a:r>
-              <a:rPr lang="en-US" dirty="0">
-                <a:latin typeface="Segoe UI" panose="020B0502040204020203" pitchFamily="34" charset="0"/>
-                <a:cs typeface="Segoe UI" panose="020B0502040204020203" pitchFamily="34" charset="0"/>
-              </a:rPr>
-              <a:t>Just for fun, try Smart Lookup again by right-clicking in the word </a:t>
-            </a:r>
-            <a:r>
-              <a:rPr lang="en-US" i="1" dirty="0">
-                <a:solidFill>
-                  <a:srgbClr val="D24726"/>
-                </a:solidFill>
-                <a:latin typeface="Segoe UI" panose="020B0502040204020203" pitchFamily="34" charset="0"/>
-                <a:cs typeface="Segoe UI" panose="020B0502040204020203" pitchFamily="34" charset="0"/>
-              </a:rPr>
-              <a:t>Office</a:t>
-            </a:r>
-            <a:r>
-              <a:rPr lang="en-US" dirty="0"/>
-              <a:t> </a:t>
-            </a:r>
-            <a:r>
-              <a:rPr lang="en-US" dirty="0">
-                <a:latin typeface="Segoe UI" panose="020B0502040204020203" pitchFamily="34" charset="0"/>
-                <a:cs typeface="Segoe UI" panose="020B0502040204020203" pitchFamily="34" charset="0"/>
-              </a:rPr>
-              <a:t>in Step 2.</a:t>
-            </a:r>
-          </a:p>
-          <a:p>
-            <a:pPr marL="0" indent="0">
-              <a:spcAft>
-                <a:spcPts val="2000"/>
-              </a:spcAft>
-              <a:buNone/>
-            </a:pPr>
-            <a:endParaRPr lang="en-US" dirty="0">
-              <a:solidFill>
-                <a:prstClr val="black">
-                  <a:lumMod val="75000"/>
-                  <a:lumOff val="25000"/>
-                </a:prstClr>
-              </a:solidFill>
-            </a:endParaRPr>
-          </a:p>
-        </p:txBody>
-      </p:sp>
-    </p:spTree>
-    <p:extLst>
-      <p:ext uri="{BB962C8B-B14F-4D97-AF65-F5344CB8AC3E}">
-        <p14:creationId xmlns:p14="http://schemas.microsoft.com/office/powerpoint/2010/main" val="1769326051"/>
       </p:ext>
     </p:extLst>
   </p:cSld>

</xml_diff>